<commit_message>
Update class 2 slides
</commit_message>
<xml_diff>
--- a/Collaterals/IntelMakersUniversity - class 2.pptx
+++ b/Collaterals/IntelMakersUniversity - class 2.pptx
@@ -6,10 +6,10 @@
     <p:sldMasterId id="2147483691" r:id="rId2"/>
   </p:sldMasterIdLst>
   <p:notesMasterIdLst>
-    <p:notesMasterId r:id="rId25"/>
+    <p:notesMasterId r:id="rId26"/>
   </p:notesMasterIdLst>
   <p:handoutMasterIdLst>
-    <p:handoutMasterId r:id="rId26"/>
+    <p:handoutMasterId r:id="rId27"/>
   </p:handoutMasterIdLst>
   <p:sldIdLst>
     <p:sldId id="318" r:id="rId3"/>
@@ -22,18 +22,19 @@
     <p:sldId id="357" r:id="rId10"/>
     <p:sldId id="360" r:id="rId11"/>
     <p:sldId id="351" r:id="rId12"/>
-    <p:sldId id="353" r:id="rId13"/>
-    <p:sldId id="354" r:id="rId14"/>
-    <p:sldId id="355" r:id="rId15"/>
-    <p:sldId id="352" r:id="rId16"/>
-    <p:sldId id="365" r:id="rId17"/>
-    <p:sldId id="366" r:id="rId18"/>
-    <p:sldId id="367" r:id="rId19"/>
-    <p:sldId id="356" r:id="rId20"/>
-    <p:sldId id="364" r:id="rId21"/>
-    <p:sldId id="358" r:id="rId22"/>
-    <p:sldId id="359" r:id="rId23"/>
-    <p:sldId id="294" r:id="rId24"/>
+    <p:sldId id="368" r:id="rId13"/>
+    <p:sldId id="353" r:id="rId14"/>
+    <p:sldId id="354" r:id="rId15"/>
+    <p:sldId id="355" r:id="rId16"/>
+    <p:sldId id="352" r:id="rId17"/>
+    <p:sldId id="365" r:id="rId18"/>
+    <p:sldId id="366" r:id="rId19"/>
+    <p:sldId id="367" r:id="rId20"/>
+    <p:sldId id="356" r:id="rId21"/>
+    <p:sldId id="364" r:id="rId22"/>
+    <p:sldId id="358" r:id="rId23"/>
+    <p:sldId id="359" r:id="rId24"/>
+    <p:sldId id="294" r:id="rId25"/>
   </p:sldIdLst>
   <p:sldSz cx="9144000" cy="5143500" type="screen16x9"/>
   <p:notesSz cx="6858000" cy="9144000"/>
@@ -985,7 +986,7 @@
           <a:noFill/>
           <a:extLst>
             <a:ext uri="{909E8E84-426E-40dd-AFC4-6F175D3DCCD1}">
-              <a14:hiddenFill xmlns="" xmlns:a14="http://schemas.microsoft.com/office/drawing/2010/main">
+              <a14:hiddenFill xmlns:a14="http://schemas.microsoft.com/office/drawing/2010/main" xmlns="">
                 <a:solidFill>
                   <a:srgbClr val="FFFFFF"/>
                 </a:solidFill>
@@ -3859,7 +3860,7 @@
           <a:noFill/>
           <a:extLst>
             <a:ext uri="{909E8E84-426E-40dd-AFC4-6F175D3DCCD1}">
-              <a14:hiddenFill xmlns="" xmlns:a14="http://schemas.microsoft.com/office/drawing/2010/main">
+              <a14:hiddenFill xmlns:a14="http://schemas.microsoft.com/office/drawing/2010/main" xmlns="">
                 <a:solidFill>
                   <a:srgbClr val="FFFFFF"/>
                 </a:solidFill>
@@ -4028,7 +4029,7 @@
           <a:noFill/>
           <a:extLst>
             <a:ext uri="{909E8E84-426E-40dd-AFC4-6F175D3DCCD1}">
-              <a14:hiddenFill xmlns="" xmlns:a14="http://schemas.microsoft.com/office/drawing/2010/main">
+              <a14:hiddenFill xmlns:a14="http://schemas.microsoft.com/office/drawing/2010/main" xmlns="">
                 <a:solidFill>
                   <a:srgbClr val="FFFFFF"/>
                 </a:solidFill>
@@ -4423,7 +4424,7 @@
           <a:noFill/>
           <a:extLst>
             <a:ext uri="{909E8E84-426E-40dd-AFC4-6F175D3DCCD1}">
-              <a14:hiddenFill xmlns="" xmlns:a14="http://schemas.microsoft.com/office/drawing/2010/main">
+              <a14:hiddenFill xmlns:a14="http://schemas.microsoft.com/office/drawing/2010/main" xmlns="">
                 <a:solidFill>
                   <a:srgbClr val="FFFFFF"/>
                 </a:solidFill>
@@ -4726,7 +4727,7 @@
           <a:noFill/>
           <a:extLst>
             <a:ext uri="{909E8E84-426E-40dd-AFC4-6F175D3DCCD1}">
-              <a14:hiddenFill xmlns="" xmlns:a14="http://schemas.microsoft.com/office/drawing/2010/main">
+              <a14:hiddenFill xmlns:a14="http://schemas.microsoft.com/office/drawing/2010/main" xmlns="">
                 <a:solidFill>
                   <a:srgbClr val="FFFFFF"/>
                 </a:solidFill>
@@ -5062,7 +5063,7 @@
           <a:noFill/>
           <a:extLst>
             <a:ext uri="{909E8E84-426E-40dd-AFC4-6F175D3DCCD1}">
-              <a14:hiddenFill xmlns="" xmlns:a14="http://schemas.microsoft.com/office/drawing/2010/main">
+              <a14:hiddenFill xmlns:a14="http://schemas.microsoft.com/office/drawing/2010/main" xmlns="">
                 <a:solidFill>
                   <a:srgbClr val="FFFFFF"/>
                 </a:solidFill>
@@ -9278,7 +9279,7 @@
           <a:noFill/>
           <a:extLst>
             <a:ext uri="{909E8E84-426E-40dd-AFC4-6F175D3DCCD1}">
-              <a14:hiddenFill xmlns="" xmlns:a14="http://schemas.microsoft.com/office/drawing/2010/main">
+              <a14:hiddenFill xmlns:a14="http://schemas.microsoft.com/office/drawing/2010/main" xmlns="">
                 <a:solidFill>
                   <a:srgbClr val="FFFFFF"/>
                 </a:solidFill>
@@ -9522,7 +9523,7 @@
           <a:noFill/>
           <a:extLst>
             <a:ext uri="{909E8E84-426E-40dd-AFC4-6F175D3DCCD1}">
-              <a14:hiddenFill xmlns="" xmlns:a14="http://schemas.microsoft.com/office/drawing/2010/main">
+              <a14:hiddenFill xmlns:a14="http://schemas.microsoft.com/office/drawing/2010/main" xmlns="">
                 <a:solidFill>
                   <a:srgbClr val="FFFFFF"/>
                 </a:solidFill>
@@ -10947,7 +10948,7 @@
           <a:noFill/>
           <a:extLst>
             <a:ext uri="{909E8E84-426E-40dd-AFC4-6F175D3DCCD1}">
-              <a14:hiddenFill xmlns="" xmlns:a14="http://schemas.microsoft.com/office/drawing/2010/main">
+              <a14:hiddenFill xmlns:a14="http://schemas.microsoft.com/office/drawing/2010/main" xmlns="">
                 <a:solidFill>
                   <a:srgbClr val="FFFFFF"/>
                 </a:solidFill>
@@ -11564,7 +11565,7 @@
           <a:noFill/>
           <a:extLst>
             <a:ext uri="{909E8E84-426E-40dd-AFC4-6F175D3DCCD1}">
-              <a14:hiddenFill xmlns="" xmlns:a14="http://schemas.microsoft.com/office/drawing/2010/main">
+              <a14:hiddenFill xmlns:a14="http://schemas.microsoft.com/office/drawing/2010/main" xmlns="">
                 <a:solidFill>
                   <a:srgbClr val="FFFFFF"/>
                 </a:solidFill>
@@ -12448,7 +12449,7 @@
           <p:cNvPr id="2" name="Slide Number Placeholder 1">
             <a:extLst>
               <a:ext uri="{FF2B5EF4-FFF2-40B4-BE49-F238E27FC236}">
-                <a16:creationId xmlns:a16="http://schemas.microsoft.com/office/drawing/2014/main" id="{904CB014-756D-4C5B-B597-C60294F61C39}"/>
+                <a16:creationId xmlns:a16="http://schemas.microsoft.com/office/drawing/2014/main" id="{430CA79A-49F8-4B8E-A4A8-30EC95F600BC}"/>
               </a:ext>
             </a:extLst>
           </p:cNvPr>
@@ -12478,7 +12479,7 @@
           <p:cNvPr id="3" name="Title 2">
             <a:extLst>
               <a:ext uri="{FF2B5EF4-FFF2-40B4-BE49-F238E27FC236}">
-                <a16:creationId xmlns:a16="http://schemas.microsoft.com/office/drawing/2014/main" id="{66B81B60-C354-48F1-934B-FCDC2EFEEC4B}"/>
+                <a16:creationId xmlns:a16="http://schemas.microsoft.com/office/drawing/2014/main" id="{BF6DADBF-D4F1-4E79-83A8-045D29E380EC}"/>
               </a:ext>
             </a:extLst>
           </p:cNvPr>
@@ -12492,7 +12493,7 @@
         <p:spPr>
           <a:xfrm>
             <a:off x="455613" y="308848"/>
-            <a:ext cx="8229600" cy="377692"/>
+            <a:ext cx="8229600" cy="356977"/>
           </a:xfrm>
         </p:spPr>
         <p:txBody>
@@ -12501,243 +12502,885 @@
           <a:p>
             <a:r>
               <a:rPr lang="en-US" dirty="0"/>
-              <a:t>RGB666 (262K colors):</a:t>
-            </a:r>
-          </a:p>
-        </p:txBody>
-      </p:sp>
-      <p:sp>
-        <p:nvSpPr>
-          <p:cNvPr id="4" name="Content Placeholder 3">
+              <a:t>ESP32 and the LCD block diagram</a:t>
+            </a:r>
+          </a:p>
+        </p:txBody>
+      </p:sp>
+      <p:sp>
+        <p:nvSpPr>
+          <p:cNvPr id="8" name="Rectangle 7">
             <a:extLst>
               <a:ext uri="{FF2B5EF4-FFF2-40B4-BE49-F238E27FC236}">
-                <a16:creationId xmlns:a16="http://schemas.microsoft.com/office/drawing/2014/main" id="{016CE2F3-748E-4592-BD52-75CC80072C68}"/>
+                <a16:creationId xmlns:a16="http://schemas.microsoft.com/office/drawing/2014/main" id="{1BC2C62D-9CBF-46F4-8238-9F03427708D6}"/>
               </a:ext>
             </a:extLst>
           </p:cNvPr>
-          <p:cNvSpPr>
-            <a:spLocks noGrp="1"/>
-          </p:cNvSpPr>
-          <p:nvPr>
-            <p:ph sz="quarter" idx="13"/>
-          </p:nvPr>
+          <p:cNvSpPr/>
+          <p:nvPr/>
         </p:nvSpPr>
         <p:spPr>
           <a:xfrm>
-            <a:off x="455613" y="710215"/>
-            <a:ext cx="8228012" cy="3918936"/>
-          </a:xfrm>
-        </p:spPr>
-        <p:txBody>
-          <a:bodyPr/>
+            <a:off x="1639409" y="1003177"/>
+            <a:ext cx="1571347" cy="1160015"/>
+          </a:xfrm>
+          <a:prstGeom prst="rect">
+            <a:avLst/>
+          </a:prstGeom>
+          <a:solidFill>
+            <a:schemeClr val="tx2"/>
+          </a:solidFill>
+          <a:ln>
+            <a:noFill/>
+          </a:ln>
+          <a:effectLst/>
+        </p:spPr>
+        <p:style>
+          <a:lnRef idx="1">
+            <a:schemeClr val="accent1"/>
+          </a:lnRef>
+          <a:fillRef idx="3">
+            <a:schemeClr val="accent1"/>
+          </a:fillRef>
+          <a:effectRef idx="2">
+            <a:schemeClr val="accent1"/>
+          </a:effectRef>
+          <a:fontRef idx="minor">
+            <a:schemeClr val="lt1"/>
+          </a:fontRef>
+        </p:style>
+        <p:txBody>
+          <a:bodyPr rtlCol="0" anchor="ctr"/>
           <a:lstStyle/>
           <a:p>
-            <a:pPr marL="171450" indent="-171450">
-              <a:spcBef>
-                <a:spcPts val="600"/>
-              </a:spcBef>
-              <a:buFont typeface="Arial" panose="020B0604020202020204" pitchFamily="34" charset="0"/>
-              <a:buChar char="•"/>
-            </a:pPr>
-            <a:r>
-              <a:rPr lang="en-US" sz="1200" dirty="0"/>
-              <a:t>Graphics Memory resides in ILI9488</a:t>
-            </a:r>
-          </a:p>
-          <a:p>
-            <a:pPr marL="396875" lvl="1" indent="-171450">
-              <a:spcBef>
-                <a:spcPts val="600"/>
-              </a:spcBef>
-              <a:buFont typeface="Arial" panose="020B0604020202020204" pitchFamily="34" charset="0"/>
-              <a:buChar char="•"/>
-            </a:pPr>
-            <a:r>
-              <a:rPr lang="en-US" sz="1200" dirty="0"/>
-              <a:t>Every write is driven directly to the ILI9488 through the SPI interface</a:t>
-            </a:r>
-          </a:p>
-          <a:p>
-            <a:pPr marL="171450" indent="-171450">
-              <a:spcBef>
-                <a:spcPts val="600"/>
-              </a:spcBef>
-              <a:buFont typeface="Arial" panose="020B0604020202020204" pitchFamily="34" charset="0"/>
-              <a:buChar char="•"/>
-            </a:pPr>
-            <a:r>
-              <a:rPr lang="en-US" sz="1200" dirty="0"/>
-              <a:t>10 FPS</a:t>
-            </a:r>
-          </a:p>
-          <a:p>
-            <a:pPr marL="171450" indent="-171450">
-              <a:spcBef>
-                <a:spcPts val="600"/>
-              </a:spcBef>
-              <a:buFont typeface="Arial" panose="020B0604020202020204" pitchFamily="34" charset="0"/>
-              <a:buChar char="•"/>
-            </a:pPr>
-            <a:r>
-              <a:rPr lang="en-US" sz="1200" dirty="0"/>
-              <a:t>Supports image displaying of compressed 24 bit bitmaps and compressed gray scale bitmaps</a:t>
-            </a:r>
-          </a:p>
-          <a:p>
-            <a:pPr marL="171450" indent="-171450">
-              <a:spcBef>
-                <a:spcPts val="600"/>
-              </a:spcBef>
-              <a:buFont typeface="Arial" panose="020B0604020202020204" pitchFamily="34" charset="0"/>
-              <a:buChar char="•"/>
-            </a:pPr>
-            <a:r>
-              <a:rPr lang="en-US" sz="1200" dirty="0"/>
-              <a:t>How to use:</a:t>
-            </a:r>
-          </a:p>
-          <a:p>
-            <a:pPr marL="396875" lvl="1" indent="-171450">
-              <a:spcBef>
-                <a:spcPts val="600"/>
-              </a:spcBef>
-              <a:buFont typeface="Arial" panose="020B0604020202020204" pitchFamily="34" charset="0"/>
-              <a:buChar char="•"/>
-            </a:pPr>
-            <a:r>
-              <a:rPr lang="en-US" sz="1200" dirty="0"/>
-              <a:t>In the main file declare a global instance:</a:t>
-            </a:r>
-          </a:p>
-          <a:p>
-            <a:pPr marL="742950" lvl="2" indent="-171450">
-              <a:spcBef>
-                <a:spcPts val="600"/>
-              </a:spcBef>
-              <a:buFont typeface="Arial" panose="020B0604020202020204" pitchFamily="34" charset="0"/>
-              <a:buChar char="•"/>
-            </a:pPr>
-            <a:r>
-              <a:rPr lang="en-US" dirty="0"/>
-              <a:t>ILI9488SPI_264KC </a:t>
-            </a:r>
-            <a:r>
-              <a:rPr lang="en-US" dirty="0" err="1"/>
-              <a:t>lcd</a:t>
-            </a:r>
-            <a:r>
-              <a:rPr lang="en-US" dirty="0"/>
-              <a:t>(480, 320);</a:t>
-            </a:r>
-          </a:p>
-          <a:p>
-            <a:pPr marL="396875" lvl="1" indent="-171450">
-              <a:spcBef>
-                <a:spcPts val="600"/>
-              </a:spcBef>
-              <a:buFont typeface="Arial" panose="020B0604020202020204" pitchFamily="34" charset="0"/>
-              <a:buChar char="•"/>
-            </a:pPr>
-            <a:r>
-              <a:rPr lang="en-US" sz="1200" dirty="0"/>
-              <a:t>In the setup initialize the LCD:</a:t>
-            </a:r>
-          </a:p>
-          <a:p>
-            <a:pPr marL="742950" lvl="2" indent="-171450">
-              <a:spcBef>
-                <a:spcPts val="600"/>
-              </a:spcBef>
-              <a:buFont typeface="Arial" panose="020B0604020202020204" pitchFamily="34" charset="0"/>
-              <a:buChar char="•"/>
-            </a:pPr>
-            <a:r>
-              <a:rPr lang="en-US" dirty="0" err="1"/>
-              <a:t>lcd.init</a:t>
-            </a:r>
-            <a:r>
-              <a:rPr lang="en-US" dirty="0"/>
-              <a:t>();</a:t>
-            </a:r>
-          </a:p>
-          <a:p>
-            <a:pPr marL="396875" lvl="1" indent="-171450">
-              <a:spcBef>
-                <a:spcPts val="600"/>
-              </a:spcBef>
-              <a:buFont typeface="Arial" panose="020B0604020202020204" pitchFamily="34" charset="0"/>
-              <a:buChar char="•"/>
-            </a:pPr>
-            <a:r>
-              <a:rPr lang="en-US" sz="1200" dirty="0"/>
-              <a:t>Sample code:</a:t>
-            </a:r>
-          </a:p>
-          <a:p>
-            <a:pPr marL="857250" lvl="2" indent="-285750">
-              <a:buFont typeface="Arial" panose="020B0604020202020204" pitchFamily="34" charset="0"/>
-              <a:buChar char="•"/>
-            </a:pPr>
-            <a:r>
-              <a:rPr lang="en-US" dirty="0" err="1"/>
-              <a:t>lcd.fillScr</a:t>
-            </a:r>
-            <a:r>
-              <a:rPr lang="en-US" dirty="0"/>
-              <a:t>(0, 0, 0); // (R,G,B) 0-255</a:t>
-            </a:r>
-          </a:p>
-          <a:p>
-            <a:pPr marL="857250" lvl="2" indent="-285750">
-              <a:buFont typeface="Arial" panose="020B0604020202020204" pitchFamily="34" charset="0"/>
-              <a:buChar char="•"/>
-            </a:pPr>
-            <a:r>
-              <a:rPr lang="en-US" dirty="0" err="1"/>
-              <a:t>lcd.setColor</a:t>
-            </a:r>
-            <a:r>
-              <a:rPr lang="en-US" dirty="0"/>
-              <a:t>(255, 0, 0);</a:t>
-            </a:r>
-          </a:p>
-          <a:p>
-            <a:pPr marL="857250" lvl="2" indent="-285750">
-              <a:buFont typeface="Arial" panose="020B0604020202020204" pitchFamily="34" charset="0"/>
-              <a:buChar char="•"/>
-            </a:pPr>
-            <a:r>
-              <a:rPr lang="en-US" dirty="0" err="1"/>
-              <a:t>lcd.drawString</a:t>
-            </a:r>
-            <a:r>
-              <a:rPr lang="en-US" dirty="0"/>
-              <a:t>("LCD DEMO", 100, 100, 25);</a:t>
-            </a:r>
-          </a:p>
-          <a:p>
-            <a:pPr marL="742950" lvl="2" indent="-171450">
-              <a:spcBef>
-                <a:spcPts val="600"/>
-              </a:spcBef>
-              <a:buFont typeface="Arial" panose="020B0604020202020204" pitchFamily="34" charset="0"/>
-              <a:buChar char="•"/>
-            </a:pPr>
-            <a:endParaRPr lang="en-US" sz="1200" dirty="0"/>
-          </a:p>
-          <a:p>
-            <a:pPr marL="171450" indent="-171450">
-              <a:buFont typeface="Arial" panose="020B0604020202020204" pitchFamily="34" charset="0"/>
-              <a:buChar char="•"/>
-            </a:pPr>
-            <a:endParaRPr lang="en-US" sz="1200" dirty="0"/>
+            <a:pPr algn="ctr"/>
+            <a:r>
+              <a:rPr lang="en-US" dirty="0"/>
+              <a:t>ESP32</a:t>
+            </a:r>
+          </a:p>
+        </p:txBody>
+      </p:sp>
+      <p:sp>
+        <p:nvSpPr>
+          <p:cNvPr id="9" name="Rectangle 8">
+            <a:extLst>
+              <a:ext uri="{FF2B5EF4-FFF2-40B4-BE49-F238E27FC236}">
+                <a16:creationId xmlns:a16="http://schemas.microsoft.com/office/drawing/2014/main" id="{1CB7C372-F4EB-4B1B-970B-28730BD31E66}"/>
+              </a:ext>
+            </a:extLst>
+          </p:cNvPr>
+          <p:cNvSpPr/>
+          <p:nvPr/>
+        </p:nvSpPr>
+        <p:spPr>
+          <a:xfrm>
+            <a:off x="3749336" y="1003177"/>
+            <a:ext cx="1287262" cy="1160015"/>
+          </a:xfrm>
+          <a:prstGeom prst="rect">
+            <a:avLst/>
+          </a:prstGeom>
+          <a:solidFill>
+            <a:schemeClr val="tx2"/>
+          </a:solidFill>
+          <a:ln>
+            <a:noFill/>
+          </a:ln>
+          <a:effectLst/>
+        </p:spPr>
+        <p:style>
+          <a:lnRef idx="1">
+            <a:schemeClr val="accent1"/>
+          </a:lnRef>
+          <a:fillRef idx="3">
+            <a:schemeClr val="accent1"/>
+          </a:fillRef>
+          <a:effectRef idx="2">
+            <a:schemeClr val="accent1"/>
+          </a:effectRef>
+          <a:fontRef idx="minor">
+            <a:schemeClr val="lt1"/>
+          </a:fontRef>
+        </p:style>
+        <p:txBody>
+          <a:bodyPr rtlCol="0" anchor="ctr"/>
+          <a:lstStyle/>
+          <a:p>
+            <a:pPr algn="ctr"/>
+            <a:r>
+              <a:rPr lang="en-US" dirty="0"/>
+              <a:t>ILI9488</a:t>
+            </a:r>
+          </a:p>
+        </p:txBody>
+      </p:sp>
+      <p:sp>
+        <p:nvSpPr>
+          <p:cNvPr id="10" name="Rectangle 9">
+            <a:extLst>
+              <a:ext uri="{FF2B5EF4-FFF2-40B4-BE49-F238E27FC236}">
+                <a16:creationId xmlns:a16="http://schemas.microsoft.com/office/drawing/2014/main" id="{EE1C0D06-BFCA-44C8-BB74-06AEBB5211EE}"/>
+              </a:ext>
+            </a:extLst>
+          </p:cNvPr>
+          <p:cNvSpPr/>
+          <p:nvPr/>
+        </p:nvSpPr>
+        <p:spPr>
+          <a:xfrm>
+            <a:off x="3848470" y="1716350"/>
+            <a:ext cx="1088994" cy="372862"/>
+          </a:xfrm>
+          <a:prstGeom prst="rect">
+            <a:avLst/>
+          </a:prstGeom>
+          <a:solidFill>
+            <a:schemeClr val="accent3">
+              <a:lumMod val="60000"/>
+              <a:lumOff val="40000"/>
+            </a:schemeClr>
+          </a:solidFill>
+          <a:ln>
+            <a:noFill/>
+          </a:ln>
+          <a:effectLst/>
+        </p:spPr>
+        <p:style>
+          <a:lnRef idx="1">
+            <a:schemeClr val="accent1"/>
+          </a:lnRef>
+          <a:fillRef idx="3">
+            <a:schemeClr val="accent1"/>
+          </a:fillRef>
+          <a:effectRef idx="2">
+            <a:schemeClr val="accent1"/>
+          </a:effectRef>
+          <a:fontRef idx="minor">
+            <a:schemeClr val="lt1"/>
+          </a:fontRef>
+        </p:style>
+        <p:txBody>
+          <a:bodyPr rtlCol="0" anchor="ctr"/>
+          <a:lstStyle/>
+          <a:p>
+            <a:pPr algn="ctr"/>
+            <a:r>
+              <a:rPr lang="en-US" sz="1200" dirty="0">
+                <a:solidFill>
+                  <a:srgbClr val="FF0000"/>
+                </a:solidFill>
+              </a:rPr>
+              <a:t>Frame buffer</a:t>
+            </a:r>
+          </a:p>
+          <a:p>
+            <a:pPr algn="ctr"/>
+            <a:r>
+              <a:rPr lang="en-US" sz="1200" dirty="0">
+                <a:solidFill>
+                  <a:srgbClr val="FF0000"/>
+                </a:solidFill>
+              </a:rPr>
+              <a:t>Memory</a:t>
+            </a:r>
+          </a:p>
+        </p:txBody>
+      </p:sp>
+      <p:sp>
+        <p:nvSpPr>
+          <p:cNvPr id="11" name="Arrow: Left-Right 10">
+            <a:extLst>
+              <a:ext uri="{FF2B5EF4-FFF2-40B4-BE49-F238E27FC236}">
+                <a16:creationId xmlns:a16="http://schemas.microsoft.com/office/drawing/2014/main" id="{B232BB48-94D2-4FE2-A857-DC7644C72490}"/>
+              </a:ext>
+            </a:extLst>
+          </p:cNvPr>
+          <p:cNvSpPr/>
+          <p:nvPr/>
+        </p:nvSpPr>
+        <p:spPr>
+          <a:xfrm>
+            <a:off x="3210757" y="1476652"/>
+            <a:ext cx="538579" cy="275208"/>
+          </a:xfrm>
+          <a:prstGeom prst="leftRightArrow">
+            <a:avLst/>
+          </a:prstGeom>
+          <a:solidFill>
+            <a:schemeClr val="tx2"/>
+          </a:solidFill>
+          <a:ln>
+            <a:noFill/>
+          </a:ln>
+          <a:effectLst/>
+        </p:spPr>
+        <p:style>
+          <a:lnRef idx="1">
+            <a:schemeClr val="accent1"/>
+          </a:lnRef>
+          <a:fillRef idx="3">
+            <a:schemeClr val="accent1"/>
+          </a:fillRef>
+          <a:effectRef idx="2">
+            <a:schemeClr val="accent1"/>
+          </a:effectRef>
+          <a:fontRef idx="minor">
+            <a:schemeClr val="lt1"/>
+          </a:fontRef>
+        </p:style>
+        <p:txBody>
+          <a:bodyPr rtlCol="0" anchor="ctr"/>
+          <a:lstStyle/>
+          <a:p>
+            <a:pPr algn="ctr"/>
+            <a:r>
+              <a:rPr lang="en-US" sz="1000" dirty="0"/>
+              <a:t>SPI</a:t>
+            </a:r>
+          </a:p>
+        </p:txBody>
+      </p:sp>
+      <p:sp>
+        <p:nvSpPr>
+          <p:cNvPr id="12" name="Rectangle 11">
+            <a:extLst>
+              <a:ext uri="{FF2B5EF4-FFF2-40B4-BE49-F238E27FC236}">
+                <a16:creationId xmlns:a16="http://schemas.microsoft.com/office/drawing/2014/main" id="{FF308C88-DCBE-4D8A-A52C-DB6737690104}"/>
+              </a:ext>
+            </a:extLst>
+          </p:cNvPr>
+          <p:cNvSpPr/>
+          <p:nvPr/>
+        </p:nvSpPr>
+        <p:spPr>
+          <a:xfrm>
+            <a:off x="5575177" y="1003176"/>
+            <a:ext cx="1584220" cy="1160015"/>
+          </a:xfrm>
+          <a:prstGeom prst="rect">
+            <a:avLst/>
+          </a:prstGeom>
+          <a:solidFill>
+            <a:schemeClr val="tx2"/>
+          </a:solidFill>
+          <a:ln>
+            <a:noFill/>
+          </a:ln>
+          <a:effectLst/>
+        </p:spPr>
+        <p:style>
+          <a:lnRef idx="1">
+            <a:schemeClr val="accent1"/>
+          </a:lnRef>
+          <a:fillRef idx="3">
+            <a:schemeClr val="accent1"/>
+          </a:fillRef>
+          <a:effectRef idx="2">
+            <a:schemeClr val="accent1"/>
+          </a:effectRef>
+          <a:fontRef idx="minor">
+            <a:schemeClr val="lt1"/>
+          </a:fontRef>
+        </p:style>
+        <p:txBody>
+          <a:bodyPr rtlCol="0" anchor="ctr"/>
+          <a:lstStyle/>
+          <a:p>
+            <a:pPr algn="ctr"/>
+            <a:r>
+              <a:rPr lang="en-US" dirty="0"/>
+              <a:t>LCD</a:t>
+            </a:r>
+          </a:p>
+        </p:txBody>
+      </p:sp>
+      <p:sp>
+        <p:nvSpPr>
+          <p:cNvPr id="13" name="Arrow: Left-Right 12">
+            <a:extLst>
+              <a:ext uri="{FF2B5EF4-FFF2-40B4-BE49-F238E27FC236}">
+                <a16:creationId xmlns:a16="http://schemas.microsoft.com/office/drawing/2014/main" id="{4158F46C-4935-40F3-88A6-5807953A81AD}"/>
+              </a:ext>
+            </a:extLst>
+          </p:cNvPr>
+          <p:cNvSpPr/>
+          <p:nvPr/>
+        </p:nvSpPr>
+        <p:spPr>
+          <a:xfrm>
+            <a:off x="5036598" y="1476652"/>
+            <a:ext cx="538579" cy="275208"/>
+          </a:xfrm>
+          <a:prstGeom prst="leftRightArrow">
+            <a:avLst/>
+          </a:prstGeom>
+          <a:solidFill>
+            <a:schemeClr val="tx2"/>
+          </a:solidFill>
+          <a:ln>
+            <a:noFill/>
+          </a:ln>
+          <a:effectLst/>
+        </p:spPr>
+        <p:style>
+          <a:lnRef idx="1">
+            <a:schemeClr val="accent1"/>
+          </a:lnRef>
+          <a:fillRef idx="3">
+            <a:schemeClr val="accent1"/>
+          </a:fillRef>
+          <a:effectRef idx="2">
+            <a:schemeClr val="accent1"/>
+          </a:effectRef>
+          <a:fontRef idx="minor">
+            <a:schemeClr val="lt1"/>
+          </a:fontRef>
+        </p:style>
+        <p:txBody>
+          <a:bodyPr rtlCol="0" anchor="ctr"/>
+          <a:lstStyle/>
+          <a:p>
+            <a:pPr algn="ctr"/>
+            <a:endParaRPr lang="en-US" sz="1000" dirty="0"/>
+          </a:p>
+        </p:txBody>
+      </p:sp>
+      <p:sp>
+        <p:nvSpPr>
+          <p:cNvPr id="14" name="TextBox 13">
+            <a:extLst>
+              <a:ext uri="{FF2B5EF4-FFF2-40B4-BE49-F238E27FC236}">
+                <a16:creationId xmlns:a16="http://schemas.microsoft.com/office/drawing/2014/main" id="{7D5D8121-470E-4891-B21F-E921E74363A5}"/>
+              </a:ext>
+            </a:extLst>
+          </p:cNvPr>
+          <p:cNvSpPr txBox="1"/>
+          <p:nvPr/>
+        </p:nvSpPr>
+        <p:spPr>
+          <a:xfrm>
+            <a:off x="1343487" y="730928"/>
+            <a:ext cx="6048653" cy="169277"/>
+          </a:xfrm>
+          <a:prstGeom prst="rect">
+            <a:avLst/>
+          </a:prstGeom>
+          <a:noFill/>
+        </p:spPr>
+        <p:txBody>
+          <a:bodyPr vert="horz" wrap="square" lIns="0" tIns="0" rIns="0" bIns="0" rtlCol="0">
+            <a:spAutoFit/>
+          </a:bodyPr>
+          <a:lstStyle/>
+          <a:p>
+            <a:r>
+              <a:rPr lang="en-US" sz="1100" b="1" dirty="0">
+                <a:solidFill>
+                  <a:srgbClr val="003C71"/>
+                </a:solidFill>
+              </a:rPr>
+              <a:t>RGB666 mode </a:t>
+            </a:r>
+            <a:r>
+              <a:rPr lang="en-US" sz="1100" dirty="0">
+                <a:solidFill>
+                  <a:srgbClr val="003C71"/>
+                </a:solidFill>
+              </a:rPr>
+              <a:t>– Any write of the graphics drivers access the frame buffer memory directly</a:t>
+            </a:r>
+          </a:p>
+        </p:txBody>
+      </p:sp>
+      <p:sp>
+        <p:nvSpPr>
+          <p:cNvPr id="15" name="Rectangle 14">
+            <a:extLst>
+              <a:ext uri="{FF2B5EF4-FFF2-40B4-BE49-F238E27FC236}">
+                <a16:creationId xmlns:a16="http://schemas.microsoft.com/office/drawing/2014/main" id="{01D8C6B0-9EE4-4C3B-A830-D2AAC171A490}"/>
+              </a:ext>
+            </a:extLst>
+          </p:cNvPr>
+          <p:cNvSpPr/>
+          <p:nvPr/>
+        </p:nvSpPr>
+        <p:spPr>
+          <a:xfrm>
+            <a:off x="1639409" y="2908915"/>
+            <a:ext cx="1571347" cy="1160015"/>
+          </a:xfrm>
+          <a:prstGeom prst="rect">
+            <a:avLst/>
+          </a:prstGeom>
+          <a:solidFill>
+            <a:schemeClr val="tx2"/>
+          </a:solidFill>
+          <a:ln>
+            <a:noFill/>
+          </a:ln>
+          <a:effectLst/>
+        </p:spPr>
+        <p:style>
+          <a:lnRef idx="1">
+            <a:schemeClr val="accent1"/>
+          </a:lnRef>
+          <a:fillRef idx="3">
+            <a:schemeClr val="accent1"/>
+          </a:fillRef>
+          <a:effectRef idx="2">
+            <a:schemeClr val="accent1"/>
+          </a:effectRef>
+          <a:fontRef idx="minor">
+            <a:schemeClr val="lt1"/>
+          </a:fontRef>
+        </p:style>
+        <p:txBody>
+          <a:bodyPr rtlCol="0" anchor="ctr"/>
+          <a:lstStyle/>
+          <a:p>
+            <a:pPr algn="ctr"/>
+            <a:r>
+              <a:rPr lang="en-US" dirty="0"/>
+              <a:t>ESP32</a:t>
+            </a:r>
+          </a:p>
+        </p:txBody>
+      </p:sp>
+      <p:sp>
+        <p:nvSpPr>
+          <p:cNvPr id="16" name="Rectangle 15">
+            <a:extLst>
+              <a:ext uri="{FF2B5EF4-FFF2-40B4-BE49-F238E27FC236}">
+                <a16:creationId xmlns:a16="http://schemas.microsoft.com/office/drawing/2014/main" id="{33A940D4-EF62-4EBE-9DE7-A916D42F139C}"/>
+              </a:ext>
+            </a:extLst>
+          </p:cNvPr>
+          <p:cNvSpPr/>
+          <p:nvPr/>
+        </p:nvSpPr>
+        <p:spPr>
+          <a:xfrm>
+            <a:off x="3749336" y="2908915"/>
+            <a:ext cx="1287262" cy="1160015"/>
+          </a:xfrm>
+          <a:prstGeom prst="rect">
+            <a:avLst/>
+          </a:prstGeom>
+          <a:solidFill>
+            <a:schemeClr val="tx2"/>
+          </a:solidFill>
+          <a:ln>
+            <a:noFill/>
+          </a:ln>
+          <a:effectLst/>
+        </p:spPr>
+        <p:style>
+          <a:lnRef idx="1">
+            <a:schemeClr val="accent1"/>
+          </a:lnRef>
+          <a:fillRef idx="3">
+            <a:schemeClr val="accent1"/>
+          </a:fillRef>
+          <a:effectRef idx="2">
+            <a:schemeClr val="accent1"/>
+          </a:effectRef>
+          <a:fontRef idx="minor">
+            <a:schemeClr val="lt1"/>
+          </a:fontRef>
+        </p:style>
+        <p:txBody>
+          <a:bodyPr rtlCol="0" anchor="ctr"/>
+          <a:lstStyle/>
+          <a:p>
+            <a:pPr algn="ctr"/>
+            <a:r>
+              <a:rPr lang="en-US" dirty="0"/>
+              <a:t>ILI9488</a:t>
+            </a:r>
+          </a:p>
+        </p:txBody>
+      </p:sp>
+      <p:sp>
+        <p:nvSpPr>
+          <p:cNvPr id="17" name="Rectangle 16">
+            <a:extLst>
+              <a:ext uri="{FF2B5EF4-FFF2-40B4-BE49-F238E27FC236}">
+                <a16:creationId xmlns:a16="http://schemas.microsoft.com/office/drawing/2014/main" id="{426161E5-6E6B-42FC-92AF-E56A99A726BA}"/>
+              </a:ext>
+            </a:extLst>
+          </p:cNvPr>
+          <p:cNvSpPr/>
+          <p:nvPr/>
+        </p:nvSpPr>
+        <p:spPr>
+          <a:xfrm>
+            <a:off x="3848470" y="3622088"/>
+            <a:ext cx="1088994" cy="372862"/>
+          </a:xfrm>
+          <a:prstGeom prst="rect">
+            <a:avLst/>
+          </a:prstGeom>
+          <a:solidFill>
+            <a:schemeClr val="accent3">
+              <a:lumMod val="60000"/>
+              <a:lumOff val="40000"/>
+            </a:schemeClr>
+          </a:solidFill>
+          <a:ln>
+            <a:noFill/>
+          </a:ln>
+          <a:effectLst/>
+        </p:spPr>
+        <p:style>
+          <a:lnRef idx="1">
+            <a:schemeClr val="accent1"/>
+          </a:lnRef>
+          <a:fillRef idx="3">
+            <a:schemeClr val="accent1"/>
+          </a:fillRef>
+          <a:effectRef idx="2">
+            <a:schemeClr val="accent1"/>
+          </a:effectRef>
+          <a:fontRef idx="minor">
+            <a:schemeClr val="lt1"/>
+          </a:fontRef>
+        </p:style>
+        <p:txBody>
+          <a:bodyPr rtlCol="0" anchor="ctr"/>
+          <a:lstStyle/>
+          <a:p>
+            <a:pPr algn="ctr"/>
+            <a:r>
+              <a:rPr lang="en-US" sz="1200" dirty="0">
+                <a:solidFill>
+                  <a:srgbClr val="FF0000"/>
+                </a:solidFill>
+              </a:rPr>
+              <a:t>Frame buffer</a:t>
+            </a:r>
+          </a:p>
+          <a:p>
+            <a:pPr algn="ctr"/>
+            <a:r>
+              <a:rPr lang="en-US" sz="1200" dirty="0">
+                <a:solidFill>
+                  <a:srgbClr val="FF0000"/>
+                </a:solidFill>
+              </a:rPr>
+              <a:t>Memory</a:t>
+            </a:r>
+          </a:p>
+        </p:txBody>
+      </p:sp>
+      <p:sp>
+        <p:nvSpPr>
+          <p:cNvPr id="18" name="Arrow: Left-Right 17">
+            <a:extLst>
+              <a:ext uri="{FF2B5EF4-FFF2-40B4-BE49-F238E27FC236}">
+                <a16:creationId xmlns:a16="http://schemas.microsoft.com/office/drawing/2014/main" id="{AF26E561-93AA-4A51-8103-C604E39AAB20}"/>
+              </a:ext>
+            </a:extLst>
+          </p:cNvPr>
+          <p:cNvSpPr/>
+          <p:nvPr/>
+        </p:nvSpPr>
+        <p:spPr>
+          <a:xfrm>
+            <a:off x="3210757" y="3382390"/>
+            <a:ext cx="538579" cy="275208"/>
+          </a:xfrm>
+          <a:prstGeom prst="leftRightArrow">
+            <a:avLst/>
+          </a:prstGeom>
+          <a:solidFill>
+            <a:schemeClr val="tx2"/>
+          </a:solidFill>
+          <a:ln>
+            <a:noFill/>
+          </a:ln>
+          <a:effectLst/>
+        </p:spPr>
+        <p:style>
+          <a:lnRef idx="1">
+            <a:schemeClr val="accent1"/>
+          </a:lnRef>
+          <a:fillRef idx="3">
+            <a:schemeClr val="accent1"/>
+          </a:fillRef>
+          <a:effectRef idx="2">
+            <a:schemeClr val="accent1"/>
+          </a:effectRef>
+          <a:fontRef idx="minor">
+            <a:schemeClr val="lt1"/>
+          </a:fontRef>
+        </p:style>
+        <p:txBody>
+          <a:bodyPr rtlCol="0" anchor="ctr"/>
+          <a:lstStyle/>
+          <a:p>
+            <a:pPr algn="ctr"/>
+            <a:r>
+              <a:rPr lang="en-US" sz="1000" dirty="0"/>
+              <a:t>SPI</a:t>
+            </a:r>
+          </a:p>
+        </p:txBody>
+      </p:sp>
+      <p:sp>
+        <p:nvSpPr>
+          <p:cNvPr id="19" name="Rectangle 18">
+            <a:extLst>
+              <a:ext uri="{FF2B5EF4-FFF2-40B4-BE49-F238E27FC236}">
+                <a16:creationId xmlns:a16="http://schemas.microsoft.com/office/drawing/2014/main" id="{79CB9A7A-F6E7-4529-A9B0-79E554038D35}"/>
+              </a:ext>
+            </a:extLst>
+          </p:cNvPr>
+          <p:cNvSpPr/>
+          <p:nvPr/>
+        </p:nvSpPr>
+        <p:spPr>
+          <a:xfrm>
+            <a:off x="5575177" y="2908914"/>
+            <a:ext cx="1584220" cy="1160015"/>
+          </a:xfrm>
+          <a:prstGeom prst="rect">
+            <a:avLst/>
+          </a:prstGeom>
+          <a:solidFill>
+            <a:schemeClr val="tx2"/>
+          </a:solidFill>
+          <a:ln>
+            <a:noFill/>
+          </a:ln>
+          <a:effectLst/>
+        </p:spPr>
+        <p:style>
+          <a:lnRef idx="1">
+            <a:schemeClr val="accent1"/>
+          </a:lnRef>
+          <a:fillRef idx="3">
+            <a:schemeClr val="accent1"/>
+          </a:fillRef>
+          <a:effectRef idx="2">
+            <a:schemeClr val="accent1"/>
+          </a:effectRef>
+          <a:fontRef idx="minor">
+            <a:schemeClr val="lt1"/>
+          </a:fontRef>
+        </p:style>
+        <p:txBody>
+          <a:bodyPr rtlCol="0" anchor="ctr"/>
+          <a:lstStyle/>
+          <a:p>
+            <a:pPr algn="ctr"/>
+            <a:r>
+              <a:rPr lang="en-US" dirty="0"/>
+              <a:t>LCD</a:t>
+            </a:r>
+          </a:p>
+        </p:txBody>
+      </p:sp>
+      <p:sp>
+        <p:nvSpPr>
+          <p:cNvPr id="20" name="Arrow: Left-Right 19">
+            <a:extLst>
+              <a:ext uri="{FF2B5EF4-FFF2-40B4-BE49-F238E27FC236}">
+                <a16:creationId xmlns:a16="http://schemas.microsoft.com/office/drawing/2014/main" id="{76B7CA5F-1800-4D54-9666-59869E7F1697}"/>
+              </a:ext>
+            </a:extLst>
+          </p:cNvPr>
+          <p:cNvSpPr/>
+          <p:nvPr/>
+        </p:nvSpPr>
+        <p:spPr>
+          <a:xfrm>
+            <a:off x="5036598" y="3382390"/>
+            <a:ext cx="538579" cy="275208"/>
+          </a:xfrm>
+          <a:prstGeom prst="leftRightArrow">
+            <a:avLst/>
+          </a:prstGeom>
+          <a:solidFill>
+            <a:schemeClr val="tx2"/>
+          </a:solidFill>
+          <a:ln>
+            <a:noFill/>
+          </a:ln>
+          <a:effectLst/>
+        </p:spPr>
+        <p:style>
+          <a:lnRef idx="1">
+            <a:schemeClr val="accent1"/>
+          </a:lnRef>
+          <a:fillRef idx="3">
+            <a:schemeClr val="accent1"/>
+          </a:fillRef>
+          <a:effectRef idx="2">
+            <a:schemeClr val="accent1"/>
+          </a:effectRef>
+          <a:fontRef idx="minor">
+            <a:schemeClr val="lt1"/>
+          </a:fontRef>
+        </p:style>
+        <p:txBody>
+          <a:bodyPr rtlCol="0" anchor="ctr"/>
+          <a:lstStyle/>
+          <a:p>
+            <a:pPr algn="ctr"/>
+            <a:endParaRPr lang="en-US" sz="1000" dirty="0"/>
+          </a:p>
+        </p:txBody>
+      </p:sp>
+      <p:sp>
+        <p:nvSpPr>
+          <p:cNvPr id="21" name="TextBox 20">
+            <a:extLst>
+              <a:ext uri="{FF2B5EF4-FFF2-40B4-BE49-F238E27FC236}">
+                <a16:creationId xmlns:a16="http://schemas.microsoft.com/office/drawing/2014/main" id="{9391AC2E-C512-44CB-A7E6-89A974129D4A}"/>
+              </a:ext>
+            </a:extLst>
+          </p:cNvPr>
+          <p:cNvSpPr txBox="1"/>
+          <p:nvPr/>
+        </p:nvSpPr>
+        <p:spPr>
+          <a:xfrm>
+            <a:off x="1343486" y="2317834"/>
+            <a:ext cx="6048653" cy="507831"/>
+          </a:xfrm>
+          <a:prstGeom prst="rect">
+            <a:avLst/>
+          </a:prstGeom>
+          <a:noFill/>
+        </p:spPr>
+        <p:txBody>
+          <a:bodyPr vert="horz" wrap="square" lIns="0" tIns="0" rIns="0" bIns="0" rtlCol="0">
+            <a:spAutoFit/>
+          </a:bodyPr>
+          <a:lstStyle/>
+          <a:p>
+            <a:r>
+              <a:rPr lang="en-US" sz="1100" b="1" dirty="0">
+                <a:solidFill>
+                  <a:srgbClr val="003C71"/>
+                </a:solidFill>
+              </a:rPr>
+              <a:t>RGB111 mode</a:t>
+            </a:r>
+            <a:r>
+              <a:rPr lang="en-US" sz="1100" dirty="0">
+                <a:solidFill>
+                  <a:srgbClr val="003C71"/>
+                </a:solidFill>
+              </a:rPr>
+              <a:t> – Any write of the graphics drivers access the </a:t>
+            </a:r>
+            <a:r>
+              <a:rPr lang="en-US" sz="1100" b="1" u="sng" dirty="0">
+                <a:solidFill>
+                  <a:srgbClr val="003C71"/>
+                </a:solidFill>
+              </a:rPr>
+              <a:t>local</a:t>
+            </a:r>
+            <a:r>
+              <a:rPr lang="en-US" sz="1100" dirty="0">
+                <a:solidFill>
+                  <a:srgbClr val="003C71"/>
+                </a:solidFill>
+              </a:rPr>
+              <a:t> frame buffer</a:t>
+            </a:r>
+          </a:p>
+          <a:p>
+            <a:r>
+              <a:rPr lang="en-US" sz="1100" dirty="0">
+                <a:solidFill>
+                  <a:srgbClr val="003C71"/>
+                </a:solidFill>
+              </a:rPr>
+              <a:t>When needed the Local frame buffer should be written to the ILI9488 frame buffer memory and only then we will see what we have written to the local frame buffer</a:t>
+            </a:r>
+          </a:p>
+        </p:txBody>
+      </p:sp>
+      <p:sp>
+        <p:nvSpPr>
+          <p:cNvPr id="22" name="Rectangle 21">
+            <a:extLst>
+              <a:ext uri="{FF2B5EF4-FFF2-40B4-BE49-F238E27FC236}">
+                <a16:creationId xmlns:a16="http://schemas.microsoft.com/office/drawing/2014/main" id="{999B0737-4FDA-4220-B1F7-EE86B34B8923}"/>
+              </a:ext>
+            </a:extLst>
+          </p:cNvPr>
+          <p:cNvSpPr/>
+          <p:nvPr/>
+        </p:nvSpPr>
+        <p:spPr>
+          <a:xfrm>
+            <a:off x="1725227" y="3622088"/>
+            <a:ext cx="1450020" cy="372862"/>
+          </a:xfrm>
+          <a:prstGeom prst="rect">
+            <a:avLst/>
+          </a:prstGeom>
+          <a:solidFill>
+            <a:schemeClr val="accent3">
+              <a:lumMod val="60000"/>
+              <a:lumOff val="40000"/>
+            </a:schemeClr>
+          </a:solidFill>
+          <a:ln>
+            <a:noFill/>
+          </a:ln>
+          <a:effectLst/>
+        </p:spPr>
+        <p:style>
+          <a:lnRef idx="1">
+            <a:schemeClr val="accent1"/>
+          </a:lnRef>
+          <a:fillRef idx="3">
+            <a:schemeClr val="accent1"/>
+          </a:fillRef>
+          <a:effectRef idx="2">
+            <a:schemeClr val="accent1"/>
+          </a:effectRef>
+          <a:fontRef idx="minor">
+            <a:schemeClr val="lt1"/>
+          </a:fontRef>
+        </p:style>
+        <p:txBody>
+          <a:bodyPr rtlCol="0" anchor="ctr"/>
+          <a:lstStyle/>
+          <a:p>
+            <a:pPr algn="ctr"/>
+            <a:r>
+              <a:rPr lang="en-US" sz="1000" dirty="0">
+                <a:solidFill>
+                  <a:srgbClr val="FF0000"/>
+                </a:solidFill>
+              </a:rPr>
+              <a:t>Local Frame buffer</a:t>
+            </a:r>
+          </a:p>
+          <a:p>
+            <a:pPr algn="ctr"/>
+            <a:r>
+              <a:rPr lang="en-US" sz="1000" dirty="0">
+                <a:solidFill>
+                  <a:srgbClr val="FF0000"/>
+                </a:solidFill>
+              </a:rPr>
+              <a:t>Memory</a:t>
+            </a:r>
           </a:p>
         </p:txBody>
       </p:sp>
     </p:spTree>
     <p:extLst>
       <p:ext uri="{BB962C8B-B14F-4D97-AF65-F5344CB8AC3E}">
-        <p14:creationId xmlns:p14="http://schemas.microsoft.com/office/powerpoint/2010/main" val="543069188"/>
+        <p14:creationId xmlns:p14="http://schemas.microsoft.com/office/powerpoint/2010/main" val="2450524778"/>
       </p:ext>
     </p:extLst>
   </p:cSld>
@@ -12834,7 +13477,7 @@
           <a:p>
             <a:r>
               <a:rPr lang="en-US" dirty="0"/>
-              <a:t>RGB111 (8 colors) – arcade mode:</a:t>
+              <a:t>RGB666 (262K colors):</a:t>
             </a:r>
           </a:p>
         </p:txBody>
@@ -12858,7 +13501,7 @@
         <p:spPr>
           <a:xfrm>
             <a:off x="455613" y="710215"/>
-            <a:ext cx="8228012" cy="1609816"/>
+            <a:ext cx="8228012" cy="3918936"/>
           </a:xfrm>
         </p:spPr>
         <p:txBody>
@@ -12874,7 +13517,20 @@
             </a:pPr>
             <a:r>
               <a:rPr lang="en-US" sz="1200" dirty="0"/>
-              <a:t>Arcade gamming oriented, performance is much higher than RGB666, flicker free </a:t>
+              <a:t>Graphics Memory resides in ILI9488</a:t>
+            </a:r>
+          </a:p>
+          <a:p>
+            <a:pPr marL="396875" lvl="1" indent="-171450">
+              <a:spcBef>
+                <a:spcPts val="600"/>
+              </a:spcBef>
+              <a:buFont typeface="Arial" panose="020B0604020202020204" pitchFamily="34" charset="0"/>
+              <a:buChar char="•"/>
+            </a:pPr>
+            <a:r>
+              <a:rPr lang="en-US" sz="1200" dirty="0"/>
+              <a:t>Every write is driven directly to the ILI9488 through the SPI interface</a:t>
             </a:r>
           </a:p>
           <a:p>
@@ -12887,7 +13543,33 @@
             </a:pPr>
             <a:r>
               <a:rPr lang="en-US" sz="1200" dirty="0"/>
-              <a:t>Graphics memory resides in ESP32!!</a:t>
+              <a:t>10 FPS</a:t>
+            </a:r>
+          </a:p>
+          <a:p>
+            <a:pPr marL="171450" indent="-171450">
+              <a:spcBef>
+                <a:spcPts val="600"/>
+              </a:spcBef>
+              <a:buFont typeface="Arial" panose="020B0604020202020204" pitchFamily="34" charset="0"/>
+              <a:buChar char="•"/>
+            </a:pPr>
+            <a:r>
+              <a:rPr lang="en-US" sz="1200" dirty="0"/>
+              <a:t>Supports image displaying of compressed 24 bit bitmaps and compressed gray scale bitmaps</a:t>
+            </a:r>
+          </a:p>
+          <a:p>
+            <a:pPr marL="171450" indent="-171450">
+              <a:spcBef>
+                <a:spcPts val="600"/>
+              </a:spcBef>
+              <a:buFont typeface="Arial" panose="020B0604020202020204" pitchFamily="34" charset="0"/>
+              <a:buChar char="•"/>
+            </a:pPr>
+            <a:r>
+              <a:rPr lang="en-US" sz="1200" dirty="0"/>
+              <a:t>How to use:</a:t>
             </a:r>
           </a:p>
           <a:p>
@@ -12900,23 +13582,11 @@
             </a:pPr>
             <a:r>
               <a:rPr lang="en-US" sz="1200" dirty="0"/>
-              <a:t>Every write is </a:t>
-            </a:r>
-            <a:r>
-              <a:rPr lang="en-US" sz="1200" b="1" dirty="0">
-                <a:highlight>
-                  <a:srgbClr val="FFFF00"/>
-                </a:highlight>
-              </a:rPr>
-              <a:t>NOT</a:t>
-            </a:r>
-            <a:r>
-              <a:rPr lang="en-US" sz="1200" dirty="0"/>
-              <a:t> driven directly to the ILI9488, only when we decide a full frame is being written</a:t>
-            </a:r>
-          </a:p>
-          <a:p>
-            <a:pPr marL="171450" indent="-171450">
+              <a:t>In the main file declare a global instance:</a:t>
+            </a:r>
+          </a:p>
+          <a:p>
+            <a:pPr marL="742950" lvl="2" indent="-171450">
               <a:spcBef>
                 <a:spcPts val="600"/>
               </a:spcBef>
@@ -12924,12 +13594,20 @@
               <a:buChar char="•"/>
             </a:pPr>
             <a:r>
-              <a:rPr lang="en-US" sz="1200" dirty="0"/>
-              <a:t>60 FPS</a:t>
-            </a:r>
-          </a:p>
-          <a:p>
-            <a:pPr marL="171450" indent="-171450">
+              <a:rPr lang="en-US" dirty="0"/>
+              <a:t>ILI9488SPI_264KC </a:t>
+            </a:r>
+            <a:r>
+              <a:rPr lang="en-US" dirty="0" err="1"/>
+              <a:t>lcd</a:t>
+            </a:r>
+            <a:r>
+              <a:rPr lang="en-US" dirty="0"/>
+              <a:t>(480, 320);</a:t>
+            </a:r>
+          </a:p>
+          <a:p>
+            <a:pPr marL="396875" lvl="1" indent="-171450">
               <a:spcBef>
                 <a:spcPts val="600"/>
               </a:spcBef>
@@ -12938,11 +13616,11 @@
             </a:pPr>
             <a:r>
               <a:rPr lang="en-US" sz="1200" dirty="0"/>
-              <a:t>Supports foreground and background</a:t>
-            </a:r>
-          </a:p>
-          <a:p>
-            <a:pPr marL="171450" indent="-171450">
+              <a:t>In the setup initialize the LCD:</a:t>
+            </a:r>
+          </a:p>
+          <a:p>
+            <a:pPr marL="742950" lvl="2" indent="-171450">
               <a:spcBef>
                 <a:spcPts val="600"/>
               </a:spcBef>
@@ -12950,106 +13628,92 @@
               <a:buChar char="•"/>
             </a:pPr>
             <a:r>
+              <a:rPr lang="en-US" dirty="0" err="1"/>
+              <a:t>lcd.init</a:t>
+            </a:r>
+            <a:r>
+              <a:rPr lang="en-US" dirty="0"/>
+              <a:t>();</a:t>
+            </a:r>
+          </a:p>
+          <a:p>
+            <a:pPr marL="396875" lvl="1" indent="-171450">
+              <a:spcBef>
+                <a:spcPts val="600"/>
+              </a:spcBef>
+              <a:buFont typeface="Arial" panose="020B0604020202020204" pitchFamily="34" charset="0"/>
+              <a:buChar char="•"/>
+            </a:pPr>
+            <a:r>
               <a:rPr lang="en-US" sz="1200" dirty="0"/>
-              <a:t>Supports image displaying of 8 colors bitmaps with skip and flip options</a:t>
-            </a:r>
-          </a:p>
-        </p:txBody>
-      </p:sp>
-      <p:pic>
-        <p:nvPicPr>
-          <p:cNvPr id="6" name="Picture 5">
-            <a:extLst>
-              <a:ext uri="{FF2B5EF4-FFF2-40B4-BE49-F238E27FC236}">
-                <a16:creationId xmlns:a16="http://schemas.microsoft.com/office/drawing/2014/main" id="{81F7C0CD-3C7E-4B65-94DD-B72B6A02F7CD}"/>
-              </a:ext>
-            </a:extLst>
-          </p:cNvPr>
-          <p:cNvPicPr>
-            <a:picLocks noChangeAspect="1"/>
-          </p:cNvPicPr>
-          <p:nvPr/>
-        </p:nvPicPr>
-        <p:blipFill>
-          <a:blip r:embed="rId2"/>
-          <a:stretch>
-            <a:fillRect/>
-          </a:stretch>
-        </p:blipFill>
-        <p:spPr>
-          <a:xfrm>
-            <a:off x="455613" y="2571750"/>
-            <a:ext cx="1965124" cy="1749708"/>
-          </a:xfrm>
-          <a:prstGeom prst="rect">
-            <a:avLst/>
-          </a:prstGeom>
-        </p:spPr>
-      </p:pic>
-      <p:pic>
-        <p:nvPicPr>
-          <p:cNvPr id="7" name="Picture 6">
-            <a:extLst>
-              <a:ext uri="{FF2B5EF4-FFF2-40B4-BE49-F238E27FC236}">
-                <a16:creationId xmlns:a16="http://schemas.microsoft.com/office/drawing/2014/main" id="{A970FD0A-D995-486E-9421-0DF45FD2E022}"/>
-              </a:ext>
-            </a:extLst>
-          </p:cNvPr>
-          <p:cNvPicPr>
-            <a:picLocks noChangeAspect="1"/>
-          </p:cNvPicPr>
-          <p:nvPr/>
-        </p:nvPicPr>
-        <p:blipFill>
-          <a:blip r:embed="rId3"/>
-          <a:stretch>
-            <a:fillRect/>
-          </a:stretch>
-        </p:blipFill>
-        <p:spPr>
-          <a:xfrm>
-            <a:off x="2678096" y="2571749"/>
-            <a:ext cx="1678725" cy="1749707"/>
-          </a:xfrm>
-          <a:prstGeom prst="rect">
-            <a:avLst/>
-          </a:prstGeom>
-        </p:spPr>
-      </p:pic>
-      <p:pic>
-        <p:nvPicPr>
-          <p:cNvPr id="8" name="Picture 7">
-            <a:extLst>
-              <a:ext uri="{FF2B5EF4-FFF2-40B4-BE49-F238E27FC236}">
-                <a16:creationId xmlns:a16="http://schemas.microsoft.com/office/drawing/2014/main" id="{5A6F8EC3-0F7D-4A96-8F27-E0802AC1C1A4}"/>
-              </a:ext>
-            </a:extLst>
-          </p:cNvPr>
-          <p:cNvPicPr>
-            <a:picLocks noChangeAspect="1"/>
-          </p:cNvPicPr>
-          <p:nvPr/>
-        </p:nvPicPr>
-        <p:blipFill>
-          <a:blip r:embed="rId4"/>
-          <a:stretch>
-            <a:fillRect/>
-          </a:stretch>
-        </p:blipFill>
-        <p:spPr>
-          <a:xfrm>
-            <a:off x="4614180" y="2571749"/>
-            <a:ext cx="1786620" cy="1746600"/>
-          </a:xfrm>
-          <a:prstGeom prst="rect">
-            <a:avLst/>
-          </a:prstGeom>
-        </p:spPr>
-      </p:pic>
+              <a:t>Sample code:</a:t>
+            </a:r>
+          </a:p>
+          <a:p>
+            <a:pPr marL="857250" lvl="2" indent="-285750">
+              <a:buFont typeface="Arial" panose="020B0604020202020204" pitchFamily="34" charset="0"/>
+              <a:buChar char="•"/>
+            </a:pPr>
+            <a:r>
+              <a:rPr lang="en-US" dirty="0" err="1"/>
+              <a:t>lcd.fillScr</a:t>
+            </a:r>
+            <a:r>
+              <a:rPr lang="en-US" dirty="0"/>
+              <a:t>(0, 0, 0); // (R,G,B) 0-255</a:t>
+            </a:r>
+          </a:p>
+          <a:p>
+            <a:pPr marL="857250" lvl="2" indent="-285750">
+              <a:buFont typeface="Arial" panose="020B0604020202020204" pitchFamily="34" charset="0"/>
+              <a:buChar char="•"/>
+            </a:pPr>
+            <a:r>
+              <a:rPr lang="en-US" dirty="0" err="1"/>
+              <a:t>lcd.setColor</a:t>
+            </a:r>
+            <a:r>
+              <a:rPr lang="en-US" dirty="0"/>
+              <a:t>(255, 0, 0);</a:t>
+            </a:r>
+          </a:p>
+          <a:p>
+            <a:pPr marL="857250" lvl="2" indent="-285750">
+              <a:buFont typeface="Arial" panose="020B0604020202020204" pitchFamily="34" charset="0"/>
+              <a:buChar char="•"/>
+            </a:pPr>
+            <a:r>
+              <a:rPr lang="en-US" dirty="0" err="1"/>
+              <a:t>lcd.drawString</a:t>
+            </a:r>
+            <a:r>
+              <a:rPr lang="en-US" dirty="0"/>
+              <a:t>("LCD DEMO", 100, 100, 25);</a:t>
+            </a:r>
+          </a:p>
+          <a:p>
+            <a:pPr marL="742950" lvl="2" indent="-171450">
+              <a:spcBef>
+                <a:spcPts val="600"/>
+              </a:spcBef>
+              <a:buFont typeface="Arial" panose="020B0604020202020204" pitchFamily="34" charset="0"/>
+              <a:buChar char="•"/>
+            </a:pPr>
+            <a:endParaRPr lang="en-US" sz="1200" dirty="0"/>
+          </a:p>
+          <a:p>
+            <a:pPr marL="171450" indent="-171450">
+              <a:buFont typeface="Arial" panose="020B0604020202020204" pitchFamily="34" charset="0"/>
+              <a:buChar char="•"/>
+            </a:pPr>
+            <a:endParaRPr lang="en-US" sz="1200" dirty="0"/>
+          </a:p>
+        </p:txBody>
+      </p:sp>
     </p:spTree>
     <p:extLst>
       <p:ext uri="{BB962C8B-B14F-4D97-AF65-F5344CB8AC3E}">
-        <p14:creationId xmlns:p14="http://schemas.microsoft.com/office/powerpoint/2010/main" val="2211147402"/>
+        <p14:creationId xmlns:p14="http://schemas.microsoft.com/office/powerpoint/2010/main" val="543069188"/>
       </p:ext>
     </p:extLst>
   </p:cSld>
@@ -13093,7 +13757,7 @@
           <p:cNvPr id="2" name="Slide Number Placeholder 1">
             <a:extLst>
               <a:ext uri="{FF2B5EF4-FFF2-40B4-BE49-F238E27FC236}">
-                <a16:creationId xmlns:a16="http://schemas.microsoft.com/office/drawing/2014/main" id="{3FDADB62-3822-4F01-9AF2-1A072D332716}"/>
+                <a16:creationId xmlns:a16="http://schemas.microsoft.com/office/drawing/2014/main" id="{904CB014-756D-4C5B-B597-C60294F61C39}"/>
               </a:ext>
             </a:extLst>
           </p:cNvPr>
@@ -13123,7 +13787,7 @@
           <p:cNvPr id="3" name="Title 2">
             <a:extLst>
               <a:ext uri="{FF2B5EF4-FFF2-40B4-BE49-F238E27FC236}">
-                <a16:creationId xmlns:a16="http://schemas.microsoft.com/office/drawing/2014/main" id="{441EA573-8861-4A0A-921D-9BC1220FBF2B}"/>
+                <a16:creationId xmlns:a16="http://schemas.microsoft.com/office/drawing/2014/main" id="{66B81B60-C354-48F1-934B-FCDC2EFEEC4B}"/>
               </a:ext>
             </a:extLst>
           </p:cNvPr>
@@ -13137,7 +13801,7 @@
         <p:spPr>
           <a:xfrm>
             <a:off x="455613" y="308848"/>
-            <a:ext cx="8229600" cy="374733"/>
+            <a:ext cx="8229600" cy="377692"/>
           </a:xfrm>
         </p:spPr>
         <p:txBody>
@@ -13146,17 +13810,134 @@
           <a:p>
             <a:r>
               <a:rPr lang="en-US" dirty="0"/>
-              <a:t>RGB111 – Arcade mode: how to use</a:t>
+              <a:t>RGB111 (8 colors) – arcade mode:</a:t>
+            </a:r>
+          </a:p>
+        </p:txBody>
+      </p:sp>
+      <p:sp>
+        <p:nvSpPr>
+          <p:cNvPr id="4" name="Content Placeholder 3">
+            <a:extLst>
+              <a:ext uri="{FF2B5EF4-FFF2-40B4-BE49-F238E27FC236}">
+                <a16:creationId xmlns:a16="http://schemas.microsoft.com/office/drawing/2014/main" id="{016CE2F3-748E-4592-BD52-75CC80072C68}"/>
+              </a:ext>
+            </a:extLst>
+          </p:cNvPr>
+          <p:cNvSpPr>
+            <a:spLocks noGrp="1"/>
+          </p:cNvSpPr>
+          <p:nvPr>
+            <p:ph sz="quarter" idx="13"/>
+          </p:nvPr>
+        </p:nvSpPr>
+        <p:spPr>
+          <a:xfrm>
+            <a:off x="455613" y="710215"/>
+            <a:ext cx="8228012" cy="1609816"/>
+          </a:xfrm>
+        </p:spPr>
+        <p:txBody>
+          <a:bodyPr/>
+          <a:lstStyle/>
+          <a:p>
+            <a:pPr marL="171450" indent="-171450">
+              <a:spcBef>
+                <a:spcPts val="600"/>
+              </a:spcBef>
+              <a:buFont typeface="Arial" panose="020B0604020202020204" pitchFamily="34" charset="0"/>
+              <a:buChar char="•"/>
+            </a:pPr>
+            <a:r>
+              <a:rPr lang="en-US" sz="1200" dirty="0"/>
+              <a:t>Arcade gamming oriented, performance is much higher than RGB666, flicker free </a:t>
+            </a:r>
+          </a:p>
+          <a:p>
+            <a:pPr marL="171450" indent="-171450">
+              <a:spcBef>
+                <a:spcPts val="600"/>
+              </a:spcBef>
+              <a:buFont typeface="Arial" panose="020B0604020202020204" pitchFamily="34" charset="0"/>
+              <a:buChar char="•"/>
+            </a:pPr>
+            <a:r>
+              <a:rPr lang="en-US" sz="1200" dirty="0"/>
+              <a:t>Graphics memory resides in ESP32!!</a:t>
+            </a:r>
+          </a:p>
+          <a:p>
+            <a:pPr marL="396875" lvl="1" indent="-171450">
+              <a:spcBef>
+                <a:spcPts val="600"/>
+              </a:spcBef>
+              <a:buFont typeface="Arial" panose="020B0604020202020204" pitchFamily="34" charset="0"/>
+              <a:buChar char="•"/>
+            </a:pPr>
+            <a:r>
+              <a:rPr lang="en-US" sz="1200" dirty="0"/>
+              <a:t>Every write is </a:t>
+            </a:r>
+            <a:r>
+              <a:rPr lang="en-US" sz="1200" b="1" dirty="0">
+                <a:highlight>
+                  <a:srgbClr val="FFFF00"/>
+                </a:highlight>
+              </a:rPr>
+              <a:t>NOT</a:t>
+            </a:r>
+            <a:r>
+              <a:rPr lang="en-US" sz="1200" dirty="0"/>
+              <a:t> driven directly to the ILI9488, only when we decide a full frame is being written</a:t>
+            </a:r>
+          </a:p>
+          <a:p>
+            <a:pPr marL="171450" indent="-171450">
+              <a:spcBef>
+                <a:spcPts val="600"/>
+              </a:spcBef>
+              <a:buFont typeface="Arial" panose="020B0604020202020204" pitchFamily="34" charset="0"/>
+              <a:buChar char="•"/>
+            </a:pPr>
+            <a:r>
+              <a:rPr lang="en-US" sz="1200" dirty="0"/>
+              <a:t>60 FPS</a:t>
+            </a:r>
+          </a:p>
+          <a:p>
+            <a:pPr marL="171450" indent="-171450">
+              <a:spcBef>
+                <a:spcPts val="600"/>
+              </a:spcBef>
+              <a:buFont typeface="Arial" panose="020B0604020202020204" pitchFamily="34" charset="0"/>
+              <a:buChar char="•"/>
+            </a:pPr>
+            <a:r>
+              <a:rPr lang="en-US" sz="1200" dirty="0"/>
+              <a:t>Supports foreground and background</a:t>
+            </a:r>
+          </a:p>
+          <a:p>
+            <a:pPr marL="171450" indent="-171450">
+              <a:spcBef>
+                <a:spcPts val="600"/>
+              </a:spcBef>
+              <a:buFont typeface="Arial" panose="020B0604020202020204" pitchFamily="34" charset="0"/>
+              <a:buChar char="•"/>
+            </a:pPr>
+            <a:r>
+              <a:rPr lang="en-US" sz="1200" dirty="0"/>
+              <a:t>Supports image displaying of 8 colors bitmaps with skip and flip options</a:t>
             </a:r>
           </a:p>
         </p:txBody>
       </p:sp>
       <p:pic>
         <p:nvPicPr>
-          <p:cNvPr id="8" name="Picture 7">
+          <p:cNvPr id="6" name="Picture 5">
             <a:extLst>
               <a:ext uri="{FF2B5EF4-FFF2-40B4-BE49-F238E27FC236}">
-                <a16:creationId xmlns:a16="http://schemas.microsoft.com/office/drawing/2014/main" id="{B46646AD-77B0-447B-8E6A-F6BDB5D03E3B}"/>
+                <a16:creationId xmlns:a16="http://schemas.microsoft.com/office/drawing/2014/main" id="{81F7C0CD-3C7E-4B65-94DD-B72B6A02F7CD}"/>
               </a:ext>
             </a:extLst>
           </p:cNvPr>
@@ -13173,8 +13954,68 @@
         </p:blipFill>
         <p:spPr>
           <a:xfrm>
-            <a:off x="455613" y="723585"/>
-            <a:ext cx="3992565" cy="3928683"/>
+            <a:off x="455613" y="2571750"/>
+            <a:ext cx="1965124" cy="1749708"/>
+          </a:xfrm>
+          <a:prstGeom prst="rect">
+            <a:avLst/>
+          </a:prstGeom>
+        </p:spPr>
+      </p:pic>
+      <p:pic>
+        <p:nvPicPr>
+          <p:cNvPr id="7" name="Picture 6">
+            <a:extLst>
+              <a:ext uri="{FF2B5EF4-FFF2-40B4-BE49-F238E27FC236}">
+                <a16:creationId xmlns:a16="http://schemas.microsoft.com/office/drawing/2014/main" id="{A970FD0A-D995-486E-9421-0DF45FD2E022}"/>
+              </a:ext>
+            </a:extLst>
+          </p:cNvPr>
+          <p:cNvPicPr>
+            <a:picLocks noChangeAspect="1"/>
+          </p:cNvPicPr>
+          <p:nvPr/>
+        </p:nvPicPr>
+        <p:blipFill>
+          <a:blip r:embed="rId3"/>
+          <a:stretch>
+            <a:fillRect/>
+          </a:stretch>
+        </p:blipFill>
+        <p:spPr>
+          <a:xfrm>
+            <a:off x="2678096" y="2571749"/>
+            <a:ext cx="1678725" cy="1749707"/>
+          </a:xfrm>
+          <a:prstGeom prst="rect">
+            <a:avLst/>
+          </a:prstGeom>
+        </p:spPr>
+      </p:pic>
+      <p:pic>
+        <p:nvPicPr>
+          <p:cNvPr id="8" name="Picture 7">
+            <a:extLst>
+              <a:ext uri="{FF2B5EF4-FFF2-40B4-BE49-F238E27FC236}">
+                <a16:creationId xmlns:a16="http://schemas.microsoft.com/office/drawing/2014/main" id="{5A6F8EC3-0F7D-4A96-8F27-E0802AC1C1A4}"/>
+              </a:ext>
+            </a:extLst>
+          </p:cNvPr>
+          <p:cNvPicPr>
+            <a:picLocks noChangeAspect="1"/>
+          </p:cNvPicPr>
+          <p:nvPr/>
+        </p:nvPicPr>
+        <p:blipFill>
+          <a:blip r:embed="rId4"/>
+          <a:stretch>
+            <a:fillRect/>
+          </a:stretch>
+        </p:blipFill>
+        <p:spPr>
+          <a:xfrm>
+            <a:off x="4614180" y="2571749"/>
+            <a:ext cx="1786620" cy="1746600"/>
           </a:xfrm>
           <a:prstGeom prst="rect">
             <a:avLst/>
@@ -13184,7 +14025,7 @@
     </p:spTree>
     <p:extLst>
       <p:ext uri="{BB962C8B-B14F-4D97-AF65-F5344CB8AC3E}">
-        <p14:creationId xmlns:p14="http://schemas.microsoft.com/office/powerpoint/2010/main" val="3962226301"/>
+        <p14:creationId xmlns:p14="http://schemas.microsoft.com/office/powerpoint/2010/main" val="2211147402"/>
       </p:ext>
     </p:extLst>
   </p:cSld>
@@ -13228,7 +14069,7 @@
           <p:cNvPr id="2" name="Slide Number Placeholder 1">
             <a:extLst>
               <a:ext uri="{FF2B5EF4-FFF2-40B4-BE49-F238E27FC236}">
-                <a16:creationId xmlns:a16="http://schemas.microsoft.com/office/drawing/2014/main" id="{6DDC3DC2-E1E0-4ADC-99B4-EC41F3605C53}"/>
+                <a16:creationId xmlns:a16="http://schemas.microsoft.com/office/drawing/2014/main" id="{3FDADB62-3822-4F01-9AF2-1A072D332716}"/>
               </a:ext>
             </a:extLst>
           </p:cNvPr>
@@ -13258,7 +14099,7 @@
           <p:cNvPr id="3" name="Title 2">
             <a:extLst>
               <a:ext uri="{FF2B5EF4-FFF2-40B4-BE49-F238E27FC236}">
-                <a16:creationId xmlns:a16="http://schemas.microsoft.com/office/drawing/2014/main" id="{D9D845F4-3243-4A3A-BD6F-1EFC4D2546A2}"/>
+                <a16:creationId xmlns:a16="http://schemas.microsoft.com/office/drawing/2014/main" id="{441EA573-8861-4A0A-921D-9BC1220FBF2B}"/>
               </a:ext>
             </a:extLst>
           </p:cNvPr>
@@ -13272,7 +14113,7 @@
         <p:spPr>
           <a:xfrm>
             <a:off x="455613" y="308848"/>
-            <a:ext cx="8229600" cy="342181"/>
+            <a:ext cx="8229600" cy="374733"/>
           </a:xfrm>
         </p:spPr>
         <p:txBody>
@@ -13281,314 +14122,45 @@
           <a:p>
             <a:r>
               <a:rPr lang="en-US" dirty="0"/>
-              <a:t>Generating bitmaps and using them in our code</a:t>
-            </a:r>
-          </a:p>
-        </p:txBody>
-      </p:sp>
-      <p:sp>
-        <p:nvSpPr>
-          <p:cNvPr id="4" name="Content Placeholder 3">
+              <a:t>RGB111 – Arcade mode: how to use</a:t>
+            </a:r>
+          </a:p>
+        </p:txBody>
+      </p:sp>
+      <p:pic>
+        <p:nvPicPr>
+          <p:cNvPr id="8" name="Picture 7">
             <a:extLst>
               <a:ext uri="{FF2B5EF4-FFF2-40B4-BE49-F238E27FC236}">
-                <a16:creationId xmlns:a16="http://schemas.microsoft.com/office/drawing/2014/main" id="{2D1D1002-C2B2-4C45-AA39-B9812A6839A7}"/>
+                <a16:creationId xmlns:a16="http://schemas.microsoft.com/office/drawing/2014/main" id="{B46646AD-77B0-447B-8E6A-F6BDB5D03E3B}"/>
               </a:ext>
             </a:extLst>
           </p:cNvPr>
-          <p:cNvSpPr>
-            <a:spLocks noGrp="1"/>
-          </p:cNvSpPr>
-          <p:nvPr>
-            <p:ph sz="quarter" idx="13"/>
-          </p:nvPr>
-        </p:nvSpPr>
+          <p:cNvPicPr>
+            <a:picLocks noChangeAspect="1"/>
+          </p:cNvPicPr>
+          <p:nvPr/>
+        </p:nvPicPr>
+        <p:blipFill>
+          <a:blip r:embed="rId2"/>
+          <a:stretch>
+            <a:fillRect/>
+          </a:stretch>
+        </p:blipFill>
         <p:spPr>
           <a:xfrm>
-            <a:off x="455613" y="742765"/>
-            <a:ext cx="8228012" cy="3778927"/>
-          </a:xfrm>
-        </p:spPr>
-        <p:txBody>
-          <a:bodyPr/>
-          <a:lstStyle/>
-          <a:p>
-            <a:pPr marL="285750" indent="-285750">
-              <a:spcBef>
-                <a:spcPts val="600"/>
-              </a:spcBef>
-              <a:buFont typeface="Arial" panose="020B0604020202020204" pitchFamily="34" charset="0"/>
-              <a:buChar char="•"/>
-            </a:pPr>
-            <a:r>
-              <a:rPr lang="en-US" sz="1600" dirty="0"/>
-              <a:t>Pick your image, make it a BMP file with size no larger than 480x320</a:t>
-            </a:r>
-          </a:p>
-          <a:p>
-            <a:pPr marL="285750" indent="-285750">
-              <a:spcBef>
-                <a:spcPts val="600"/>
-              </a:spcBef>
-              <a:buFont typeface="Arial" panose="020B0604020202020204" pitchFamily="34" charset="0"/>
-              <a:buChar char="•"/>
-            </a:pPr>
-            <a:r>
-              <a:rPr lang="en-US" sz="1600" dirty="0"/>
-              <a:t>Use the BMPconverter.exe in the tools directory in the GIT</a:t>
-            </a:r>
-          </a:p>
-          <a:p>
-            <a:pPr marL="285750" indent="-285750">
-              <a:spcBef>
-                <a:spcPts val="600"/>
-              </a:spcBef>
-              <a:buFont typeface="Arial" panose="020B0604020202020204" pitchFamily="34" charset="0"/>
-              <a:buChar char="•"/>
-            </a:pPr>
-            <a:r>
-              <a:rPr lang="en-US" sz="1600" dirty="0"/>
-              <a:t>The tool generates a C file containing the array (bitmap)</a:t>
-            </a:r>
-          </a:p>
-          <a:p>
-            <a:pPr marL="285750" indent="-285750">
-              <a:spcBef>
-                <a:spcPts val="600"/>
-              </a:spcBef>
-              <a:buFont typeface="Arial" panose="020B0604020202020204" pitchFamily="34" charset="0"/>
-              <a:buChar char="•"/>
-            </a:pPr>
-            <a:r>
-              <a:rPr lang="en-US" sz="1600" dirty="0"/>
-              <a:t>Place the file in your project directory as is</a:t>
-            </a:r>
-          </a:p>
-          <a:p>
-            <a:pPr marL="285750" indent="-285750">
-              <a:spcBef>
-                <a:spcPts val="600"/>
-              </a:spcBef>
-              <a:buFont typeface="Arial" panose="020B0604020202020204" pitchFamily="34" charset="0"/>
-              <a:buChar char="•"/>
-            </a:pPr>
-            <a:r>
-              <a:rPr lang="en-US" sz="1600" dirty="0"/>
-              <a:t>Generate a declaration in your main file (where loop resides)</a:t>
-            </a:r>
-          </a:p>
-          <a:p>
-            <a:pPr marL="511175" lvl="1" indent="-285750">
-              <a:spcBef>
-                <a:spcPts val="600"/>
-              </a:spcBef>
-              <a:buFont typeface="Arial" panose="020B0604020202020204" pitchFamily="34" charset="0"/>
-              <a:buChar char="•"/>
-            </a:pPr>
-            <a:r>
-              <a:rPr lang="en-US" sz="1600" dirty="0"/>
-              <a:t>extern const unsigned char/unsigned int/unsigned short </a:t>
-            </a:r>
-            <a:r>
-              <a:rPr lang="en-US" sz="1600" dirty="0" err="1"/>
-              <a:t>FlappyBird</a:t>
-            </a:r>
-            <a:r>
-              <a:rPr lang="en-US" sz="1600" dirty="0"/>
-              <a:t>[];</a:t>
-            </a:r>
-          </a:p>
-          <a:p>
-            <a:pPr marL="285750" indent="-285750">
-              <a:spcBef>
-                <a:spcPts val="600"/>
-              </a:spcBef>
-              <a:buFont typeface="Arial" panose="020B0604020202020204" pitchFamily="34" charset="0"/>
-              <a:buChar char="•"/>
-            </a:pPr>
-            <a:r>
-              <a:rPr lang="en-US" sz="1600" dirty="0"/>
-              <a:t>For 262K mode use:</a:t>
-            </a:r>
-          </a:p>
-          <a:p>
-            <a:pPr marL="511175" lvl="1" indent="-285750">
-              <a:spcBef>
-                <a:spcPts val="600"/>
-              </a:spcBef>
-              <a:buFont typeface="Arial" panose="020B0604020202020204" pitchFamily="34" charset="0"/>
-              <a:buChar char="•"/>
-            </a:pPr>
-            <a:r>
-              <a:rPr lang="en-US" sz="1600" dirty="0"/>
-              <a:t>LCD.drawCompressed24bitBitmap(</a:t>
-            </a:r>
-            <a:r>
-              <a:rPr lang="en-US" sz="1600" dirty="0" err="1"/>
-              <a:t>x,y</a:t>
-            </a:r>
-            <a:r>
-              <a:rPr lang="en-US" sz="1600" dirty="0"/>
-              <a:t>, </a:t>
-            </a:r>
-            <a:r>
-              <a:rPr lang="en-US" sz="1600" dirty="0" err="1"/>
-              <a:t>FlappyBird</a:t>
-            </a:r>
-            <a:r>
-              <a:rPr lang="en-US" sz="1600" dirty="0"/>
-              <a:t>);</a:t>
-            </a:r>
-          </a:p>
-          <a:p>
-            <a:pPr marL="511175" lvl="1" indent="-285750">
-              <a:spcBef>
-                <a:spcPts val="600"/>
-              </a:spcBef>
-              <a:buFont typeface="Arial" panose="020B0604020202020204" pitchFamily="34" charset="0"/>
-              <a:buChar char="•"/>
-            </a:pPr>
-            <a:r>
-              <a:rPr lang="en-US" sz="1600" dirty="0"/>
-              <a:t>LCD. </a:t>
-            </a:r>
-            <a:r>
-              <a:rPr lang="en-US" sz="1600" dirty="0" err="1"/>
-              <a:t>drawCompressedGrayScaleBitmap</a:t>
-            </a:r>
-            <a:r>
-              <a:rPr lang="en-US" sz="1600" dirty="0"/>
-              <a:t>(</a:t>
-            </a:r>
-            <a:r>
-              <a:rPr lang="en-US" sz="1600" dirty="0" err="1"/>
-              <a:t>x,y</a:t>
-            </a:r>
-            <a:r>
-              <a:rPr lang="en-US" sz="1600" dirty="0"/>
-              <a:t>, </a:t>
-            </a:r>
-            <a:r>
-              <a:rPr lang="en-US" sz="1600" dirty="0" err="1"/>
-              <a:t>FlappyBird</a:t>
-            </a:r>
-            <a:r>
-              <a:rPr lang="en-US" sz="1600" dirty="0"/>
-              <a:t>)</a:t>
-            </a:r>
-          </a:p>
-          <a:p>
-            <a:pPr marL="285750" indent="-285750">
-              <a:spcBef>
-                <a:spcPts val="600"/>
-              </a:spcBef>
-              <a:buFont typeface="Arial" panose="020B0604020202020204" pitchFamily="34" charset="0"/>
-              <a:buChar char="•"/>
-            </a:pPr>
-            <a:r>
-              <a:rPr lang="en-US" sz="1600" dirty="0"/>
-              <a:t>For 8 colors mode use:</a:t>
-            </a:r>
-          </a:p>
-          <a:p>
-            <a:pPr marL="511175" lvl="1" indent="-285750">
-              <a:spcBef>
-                <a:spcPts val="600"/>
-              </a:spcBef>
-              <a:buFont typeface="Arial" panose="020B0604020202020204" pitchFamily="34" charset="0"/>
-              <a:buChar char="•"/>
-            </a:pPr>
-            <a:r>
-              <a:rPr lang="en-US" sz="1600" dirty="0"/>
-              <a:t>LCD.</a:t>
-            </a:r>
-            <a:r>
-              <a:rPr lang="en-US" dirty="0"/>
-              <a:t> </a:t>
-            </a:r>
-            <a:r>
-              <a:rPr lang="en-US" dirty="0" err="1"/>
-              <a:t>drawBitmap</a:t>
-            </a:r>
-            <a:r>
-              <a:rPr lang="en-US" dirty="0"/>
-              <a:t>(</a:t>
-            </a:r>
-            <a:r>
-              <a:rPr lang="en-US" dirty="0" err="1"/>
-              <a:t>x,y</a:t>
-            </a:r>
-            <a:r>
-              <a:rPr lang="en-US" dirty="0"/>
-              <a:t>, </a:t>
-            </a:r>
-            <a:r>
-              <a:rPr lang="en-US" dirty="0" err="1"/>
-              <a:t>FlappyBird</a:t>
-            </a:r>
-            <a:r>
-              <a:rPr lang="en-US" dirty="0"/>
-              <a:t>, </a:t>
-            </a:r>
-            <a:r>
-              <a:rPr lang="en-US" dirty="0">
-                <a:solidFill>
-                  <a:schemeClr val="accent3">
-                    <a:lumMod val="75000"/>
-                  </a:schemeClr>
-                </a:solidFill>
-              </a:rPr>
-              <a:t>/*</a:t>
-            </a:r>
-            <a:r>
-              <a:rPr lang="en-US" dirty="0" err="1">
-                <a:solidFill>
-                  <a:schemeClr val="accent3">
-                    <a:lumMod val="75000"/>
-                  </a:schemeClr>
-                </a:solidFill>
-              </a:rPr>
-              <a:t>useSkipBit</a:t>
-            </a:r>
-            <a:r>
-              <a:rPr lang="en-US" dirty="0">
-                <a:solidFill>
-                  <a:schemeClr val="accent3">
-                    <a:lumMod val="75000"/>
-                  </a:schemeClr>
-                </a:solidFill>
-              </a:rPr>
-              <a:t>*/</a:t>
-            </a:r>
-            <a:r>
-              <a:rPr lang="en-US" dirty="0"/>
-              <a:t> true, </a:t>
-            </a:r>
-            <a:r>
-              <a:rPr lang="en-US" dirty="0">
-                <a:solidFill>
-                  <a:schemeClr val="accent3">
-                    <a:lumMod val="75000"/>
-                  </a:schemeClr>
-                </a:solidFill>
-              </a:rPr>
-              <a:t>/*Flip Opt.*/</a:t>
-            </a:r>
-            <a:r>
-              <a:rPr lang="en-US" dirty="0" err="1"/>
-              <a:t>noflip</a:t>
-            </a:r>
-            <a:r>
-              <a:rPr lang="en-US" dirty="0"/>
-              <a:t>);</a:t>
-            </a:r>
-            <a:endParaRPr lang="en-US" sz="1600" dirty="0"/>
-          </a:p>
-        </p:txBody>
-      </p:sp>
+            <a:off x="455613" y="723585"/>
+            <a:ext cx="3992565" cy="3928683"/>
+          </a:xfrm>
+          <a:prstGeom prst="rect">
+            <a:avLst/>
+          </a:prstGeom>
+        </p:spPr>
+      </p:pic>
     </p:spTree>
     <p:extLst>
       <p:ext uri="{BB962C8B-B14F-4D97-AF65-F5344CB8AC3E}">
-        <p14:creationId xmlns:p14="http://schemas.microsoft.com/office/powerpoint/2010/main" val="2989656303"/>
+        <p14:creationId xmlns:p14="http://schemas.microsoft.com/office/powerpoint/2010/main" val="3962226301"/>
       </p:ext>
     </p:extLst>
   </p:cSld>
@@ -13632,7 +14204,7 @@
           <p:cNvPr id="2" name="Slide Number Placeholder 1">
             <a:extLst>
               <a:ext uri="{FF2B5EF4-FFF2-40B4-BE49-F238E27FC236}">
-                <a16:creationId xmlns:a16="http://schemas.microsoft.com/office/drawing/2014/main" id="{D356F11F-1EB0-4A6D-A2A2-3CFE85E99179}"/>
+                <a16:creationId xmlns:a16="http://schemas.microsoft.com/office/drawing/2014/main" id="{6DDC3DC2-E1E0-4ADC-99B4-EC41F3605C53}"/>
               </a:ext>
             </a:extLst>
           </p:cNvPr>
@@ -13662,7 +14234,7 @@
           <p:cNvPr id="3" name="Title 2">
             <a:extLst>
               <a:ext uri="{FF2B5EF4-FFF2-40B4-BE49-F238E27FC236}">
-                <a16:creationId xmlns:a16="http://schemas.microsoft.com/office/drawing/2014/main" id="{DB94123A-6FE7-4D27-9D28-AA73B35C79A8}"/>
+                <a16:creationId xmlns:a16="http://schemas.microsoft.com/office/drawing/2014/main" id="{D9D845F4-3243-4A3A-BD6F-1EFC4D2546A2}"/>
               </a:ext>
             </a:extLst>
           </p:cNvPr>
@@ -13675,8 +14247,8 @@
         </p:nvSpPr>
         <p:spPr>
           <a:xfrm>
-            <a:off x="454025" y="111998"/>
-            <a:ext cx="8229600" cy="357902"/>
+            <a:off x="455613" y="308848"/>
+            <a:ext cx="8229600" cy="342181"/>
           </a:xfrm>
         </p:spPr>
         <p:txBody>
@@ -13685,7 +14257,7 @@
           <a:p>
             <a:r>
               <a:rPr lang="en-US" dirty="0"/>
-              <a:t>The touch panel</a:t>
+              <a:t>Generating bitmaps and using them in our code</a:t>
             </a:r>
           </a:p>
         </p:txBody>
@@ -13695,7 +14267,7 @@
           <p:cNvPr id="4" name="Content Placeholder 3">
             <a:extLst>
               <a:ext uri="{FF2B5EF4-FFF2-40B4-BE49-F238E27FC236}">
-                <a16:creationId xmlns:a16="http://schemas.microsoft.com/office/drawing/2014/main" id="{A1DD0B1D-0C34-4ABD-9C21-20EB9E7594CB}"/>
+                <a16:creationId xmlns:a16="http://schemas.microsoft.com/office/drawing/2014/main" id="{2D1D1002-C2B2-4C45-AA39-B9812A6839A7}"/>
               </a:ext>
             </a:extLst>
           </p:cNvPr>
@@ -13708,8 +14280,8 @@
         </p:nvSpPr>
         <p:spPr>
           <a:xfrm>
-            <a:off x="455613" y="533401"/>
-            <a:ext cx="8228012" cy="4095750"/>
+            <a:off x="455613" y="742765"/>
+            <a:ext cx="8228012" cy="3778927"/>
           </a:xfrm>
         </p:spPr>
         <p:txBody>
@@ -13717,144 +14289,282 @@
           <a:lstStyle/>
           <a:p>
             <a:pPr marL="285750" indent="-285750">
+              <a:spcBef>
+                <a:spcPts val="600"/>
+              </a:spcBef>
               <a:buFont typeface="Arial" panose="020B0604020202020204" pitchFamily="34" charset="0"/>
               <a:buChar char="•"/>
             </a:pPr>
             <a:r>
-              <a:rPr lang="en-US" sz="1400" dirty="0"/>
-              <a:t>Capacitive touch panel with two points</a:t>
+              <a:rPr lang="en-US" sz="1600" dirty="0"/>
+              <a:t>Pick your image, make it a BMP file with size no larger than 480x320</a:t>
             </a:r>
           </a:p>
           <a:p>
             <a:pPr marL="285750" indent="-285750">
+              <a:spcBef>
+                <a:spcPts val="600"/>
+              </a:spcBef>
               <a:buFont typeface="Arial" panose="020B0604020202020204" pitchFamily="34" charset="0"/>
               <a:buChar char="•"/>
             </a:pPr>
             <a:r>
-              <a:rPr lang="en-US" sz="1400" dirty="0"/>
-              <a:t>I2C interface – 100 </a:t>
-            </a:r>
-            <a:r>
-              <a:rPr lang="en-US" sz="1400" dirty="0" err="1"/>
-              <a:t>KHz</a:t>
-            </a:r>
-            <a:endParaRPr lang="en-US" sz="1400" dirty="0"/>
+              <a:rPr lang="en-US" sz="1600" dirty="0"/>
+              <a:t>Use the BMPconverter.exe in the tools directory in the GIT</a:t>
+            </a:r>
           </a:p>
           <a:p>
             <a:pPr marL="285750" indent="-285750">
+              <a:spcBef>
+                <a:spcPts val="600"/>
+              </a:spcBef>
               <a:buFont typeface="Arial" panose="020B0604020202020204" pitchFamily="34" charset="0"/>
               <a:buChar char="•"/>
             </a:pPr>
             <a:r>
-              <a:rPr lang="en-US" sz="1400" dirty="0"/>
-              <a:t>Sensitivity can be set from few centimeters to direct touch</a:t>
+              <a:rPr lang="en-US" sz="1600" dirty="0"/>
+              <a:t>The tool generates a C file containing the array (bitmap)</a:t>
             </a:r>
           </a:p>
           <a:p>
             <a:pPr marL="285750" indent="-285750">
+              <a:spcBef>
+                <a:spcPts val="600"/>
+              </a:spcBef>
               <a:buFont typeface="Arial" panose="020B0604020202020204" pitchFamily="34" charset="0"/>
               <a:buChar char="•"/>
             </a:pPr>
             <a:r>
-              <a:rPr lang="en-US" sz="1400" dirty="0"/>
-              <a:t>Interrupt driven directly to the MCU to indicate a touch</a:t>
-            </a:r>
-          </a:p>
-          <a:p>
-            <a:pPr marL="511175" lvl="1" indent="-285750">
+              <a:rPr lang="en-US" sz="1600" dirty="0"/>
+              <a:t>Place the file in your project directory as is</a:t>
+            </a:r>
+          </a:p>
+          <a:p>
+            <a:pPr marL="285750" indent="-285750">
+              <a:spcBef>
+                <a:spcPts val="600"/>
+              </a:spcBef>
               <a:buFont typeface="Arial" panose="020B0604020202020204" pitchFamily="34" charset="0"/>
               <a:buChar char="•"/>
             </a:pPr>
             <a:r>
-              <a:rPr lang="en-US" sz="1400" dirty="0"/>
-              <a:t>Doesn’t need an expansive I2C read to check for a touch!</a:t>
-            </a:r>
-          </a:p>
-          <a:p>
-            <a:pPr marL="285750" indent="-285750">
+              <a:rPr lang="en-US" sz="1600" dirty="0"/>
+              <a:t>Generate a declaration in your main file (where loop resides)</a:t>
+            </a:r>
+          </a:p>
+          <a:p>
+            <a:pPr marL="511175" lvl="1" indent="-285750">
+              <a:spcBef>
+                <a:spcPts val="600"/>
+              </a:spcBef>
               <a:buFont typeface="Arial" panose="020B0604020202020204" pitchFamily="34" charset="0"/>
               <a:buChar char="•"/>
             </a:pPr>
             <a:r>
-              <a:rPr lang="en-US" sz="1400" b="1" dirty="0"/>
-              <a:t>No</a:t>
-            </a:r>
-            <a:r>
-              <a:rPr lang="en-US" sz="1400" dirty="0"/>
-              <a:t> need for a calibration process!</a:t>
+              <a:rPr lang="en-US" sz="1600" dirty="0"/>
+              <a:t>extern const unsigned char/unsigned int/unsigned short </a:t>
+            </a:r>
+            <a:r>
+              <a:rPr lang="en-US" sz="1600" dirty="0" err="1"/>
+              <a:t>FlappyBird</a:t>
+            </a:r>
+            <a:r>
+              <a:rPr lang="en-US" sz="1600" dirty="0"/>
+              <a:t>[];</a:t>
             </a:r>
           </a:p>
           <a:p>
             <a:pPr marL="285750" indent="-285750">
+              <a:spcBef>
+                <a:spcPts val="600"/>
+              </a:spcBef>
               <a:buFont typeface="Arial" panose="020B0604020202020204" pitchFamily="34" charset="0"/>
               <a:buChar char="•"/>
             </a:pPr>
             <a:r>
-              <a:rPr lang="en-US" sz="1400" dirty="0"/>
-              <a:t>Need to call the initialization function in setup</a:t>
-            </a:r>
-          </a:p>
-          <a:p>
-            <a:pPr marL="285750" indent="-285750">
+              <a:rPr lang="en-US" sz="1600" dirty="0"/>
+              <a:t>For 262K mode use:</a:t>
+            </a:r>
+          </a:p>
+          <a:p>
+            <a:pPr marL="511175" lvl="1" indent="-285750">
+              <a:spcBef>
+                <a:spcPts val="600"/>
+              </a:spcBef>
               <a:buFont typeface="Arial" panose="020B0604020202020204" pitchFamily="34" charset="0"/>
               <a:buChar char="•"/>
             </a:pPr>
             <a:r>
-              <a:rPr lang="en-US" sz="1400" dirty="0"/>
-              <a:t>Usage:</a:t>
+              <a:rPr lang="en-US" sz="1600" dirty="0"/>
+              <a:t>LCD.drawCompressed24bitBitmap(</a:t>
+            </a:r>
+            <a:r>
+              <a:rPr lang="en-US" sz="1600" dirty="0" err="1"/>
+              <a:t>x,y</a:t>
+            </a:r>
+            <a:r>
+              <a:rPr lang="en-US" sz="1600" dirty="0"/>
+              <a:t>, </a:t>
+            </a:r>
+            <a:r>
+              <a:rPr lang="en-US" sz="1600" dirty="0" err="1"/>
+              <a:t>FlappyBird</a:t>
+            </a:r>
+            <a:r>
+              <a:rPr lang="en-US" sz="1600" dirty="0"/>
+              <a:t>);</a:t>
             </a:r>
           </a:p>
           <a:p>
             <a:pPr marL="511175" lvl="1" indent="-285750">
+              <a:spcBef>
+                <a:spcPts val="600"/>
+              </a:spcBef>
               <a:buFont typeface="Arial" panose="020B0604020202020204" pitchFamily="34" charset="0"/>
               <a:buChar char="•"/>
             </a:pPr>
             <a:r>
-              <a:rPr lang="en-US" sz="1400" dirty="0"/>
-              <a:t>Check if touched: if(</a:t>
-            </a:r>
-            <a:r>
-              <a:rPr lang="en-US" sz="1400" b="1" dirty="0"/>
-              <a:t>TOUCH_PANNEL_TOUCHED</a:t>
-            </a:r>
-            <a:r>
-              <a:rPr lang="en-US" sz="1400" dirty="0"/>
-              <a:t>())…</a:t>
-            </a:r>
-          </a:p>
-          <a:p>
-            <a:pPr marL="511175" lvl="1" indent="-285750">
+              <a:rPr lang="en-US" sz="1600" dirty="0"/>
+              <a:t>LCD. </a:t>
+            </a:r>
+            <a:r>
+              <a:rPr lang="en-US" sz="1600" dirty="0" err="1"/>
+              <a:t>drawCompressedGrayScaleBitmap</a:t>
+            </a:r>
+            <a:r>
+              <a:rPr lang="en-US" sz="1600" dirty="0"/>
+              <a:t>(</a:t>
+            </a:r>
+            <a:r>
+              <a:rPr lang="en-US" sz="1600" dirty="0" err="1"/>
+              <a:t>x,y</a:t>
+            </a:r>
+            <a:r>
+              <a:rPr lang="en-US" sz="1600" dirty="0"/>
+              <a:t>, </a:t>
+            </a:r>
+            <a:r>
+              <a:rPr lang="en-US" sz="1600" dirty="0" err="1"/>
+              <a:t>FlappyBird</a:t>
+            </a:r>
+            <a:r>
+              <a:rPr lang="en-US" sz="1600" dirty="0"/>
+              <a:t>)</a:t>
+            </a:r>
+          </a:p>
+          <a:p>
+            <a:pPr marL="285750" indent="-285750">
+              <a:spcBef>
+                <a:spcPts val="600"/>
+              </a:spcBef>
               <a:buFont typeface="Arial" panose="020B0604020202020204" pitchFamily="34" charset="0"/>
               <a:buChar char="•"/>
             </a:pPr>
             <a:r>
-              <a:rPr lang="en-US" sz="1400" dirty="0"/>
-              <a:t>If yes: </a:t>
-            </a:r>
-            <a:r>
-              <a:rPr lang="fr-FR" sz="1400" b="1" dirty="0"/>
-              <a:t>count</a:t>
-            </a:r>
-            <a:r>
-              <a:rPr lang="fr-FR" sz="1400" dirty="0"/>
-              <a:t> = </a:t>
-            </a:r>
-            <a:r>
-              <a:rPr lang="fr-FR" sz="1400" b="1" dirty="0" err="1"/>
-              <a:t>ts.getTouchedPoints</a:t>
-            </a:r>
-            <a:r>
-              <a:rPr lang="fr-FR" sz="1400" dirty="0"/>
-              <a:t>(&amp;x1, &amp;y1, &amp;x2, &amp;y2);</a:t>
-            </a:r>
-            <a:endParaRPr lang="en-US" sz="1400" dirty="0"/>
+              <a:rPr lang="en-US" sz="1600" dirty="0"/>
+              <a:t>For 8 colors mode use:</a:t>
+            </a:r>
+          </a:p>
+          <a:p>
+            <a:pPr marL="511175" lvl="1" indent="-285750">
+              <a:spcBef>
+                <a:spcPts val="600"/>
+              </a:spcBef>
+              <a:buFont typeface="Arial" panose="020B0604020202020204" pitchFamily="34" charset="0"/>
+              <a:buChar char="•"/>
+            </a:pPr>
+            <a:r>
+              <a:rPr lang="en-US" sz="1600" dirty="0"/>
+              <a:t>LCD.</a:t>
+            </a:r>
+            <a:r>
+              <a:rPr lang="en-US" dirty="0"/>
+              <a:t> </a:t>
+            </a:r>
+            <a:r>
+              <a:rPr lang="en-US" dirty="0" err="1"/>
+              <a:t>drawBitmap</a:t>
+            </a:r>
+            <a:r>
+              <a:rPr lang="en-US" dirty="0"/>
+              <a:t>(</a:t>
+            </a:r>
+            <a:r>
+              <a:rPr lang="en-US" dirty="0" err="1"/>
+              <a:t>x,y</a:t>
+            </a:r>
+            <a:r>
+              <a:rPr lang="en-US" dirty="0"/>
+              <a:t>, </a:t>
+            </a:r>
+            <a:r>
+              <a:rPr lang="en-US" dirty="0" err="1"/>
+              <a:t>FlappyBird</a:t>
+            </a:r>
+            <a:r>
+              <a:rPr lang="en-US" dirty="0"/>
+              <a:t>, </a:t>
+            </a:r>
+            <a:r>
+              <a:rPr lang="en-US" dirty="0">
+                <a:solidFill>
+                  <a:schemeClr val="accent3">
+                    <a:lumMod val="75000"/>
+                  </a:schemeClr>
+                </a:solidFill>
+              </a:rPr>
+              <a:t>/*</a:t>
+            </a:r>
+            <a:r>
+              <a:rPr lang="en-US" dirty="0" err="1">
+                <a:solidFill>
+                  <a:schemeClr val="accent3">
+                    <a:lumMod val="75000"/>
+                  </a:schemeClr>
+                </a:solidFill>
+              </a:rPr>
+              <a:t>useSkipBit</a:t>
+            </a:r>
+            <a:r>
+              <a:rPr lang="en-US" dirty="0">
+                <a:solidFill>
+                  <a:schemeClr val="accent3">
+                    <a:lumMod val="75000"/>
+                  </a:schemeClr>
+                </a:solidFill>
+              </a:rPr>
+              <a:t>*/</a:t>
+            </a:r>
+            <a:r>
+              <a:rPr lang="en-US" dirty="0"/>
+              <a:t> true, </a:t>
+            </a:r>
+            <a:r>
+              <a:rPr lang="en-US" dirty="0">
+                <a:solidFill>
+                  <a:schemeClr val="accent3">
+                    <a:lumMod val="75000"/>
+                  </a:schemeClr>
+                </a:solidFill>
+              </a:rPr>
+              <a:t>/*Flip Opt.*/</a:t>
+            </a:r>
+            <a:r>
+              <a:rPr lang="en-US" dirty="0" err="1"/>
+              <a:t>noflip</a:t>
+            </a:r>
+            <a:r>
+              <a:rPr lang="en-US" dirty="0"/>
+              <a:t>);</a:t>
+            </a:r>
+            <a:endParaRPr lang="en-US" sz="1600" dirty="0"/>
           </a:p>
         </p:txBody>
       </p:sp>
     </p:spTree>
     <p:extLst>
       <p:ext uri="{BB962C8B-B14F-4D97-AF65-F5344CB8AC3E}">
-        <p14:creationId xmlns:p14="http://schemas.microsoft.com/office/powerpoint/2010/main" val="447662515"/>
+        <p14:creationId xmlns:p14="http://schemas.microsoft.com/office/powerpoint/2010/main" val="2989656303"/>
       </p:ext>
     </p:extLst>
   </p:cSld>
@@ -13951,7 +14661,7 @@
           <a:p>
             <a:r>
               <a:rPr lang="en-US" dirty="0"/>
-              <a:t>The joy stick</a:t>
+              <a:t>The touch panel</a:t>
             </a:r>
           </a:p>
         </p:txBody>
@@ -13988,7 +14698,7 @@
             </a:pPr>
             <a:r>
               <a:rPr lang="en-US" sz="1400" dirty="0"/>
-              <a:t>Two axis – X and Y, both analog</a:t>
+              <a:t>Capacitive touch panel with two points</a:t>
             </a:r>
           </a:p>
           <a:p>
@@ -13998,16 +14708,13 @@
             </a:pPr>
             <a:r>
               <a:rPr lang="en-US" sz="1400" dirty="0"/>
-              <a:t>Using I/</a:t>
+              <a:t>I2C interface – 100 </a:t>
             </a:r>
             <a:r>
               <a:rPr lang="en-US" sz="1400" dirty="0" err="1"/>
-              <a:t>Os</a:t>
-            </a:r>
-            <a:r>
-              <a:rPr lang="en-US" sz="1400" dirty="0"/>
-              <a:t>: 36 and 39 and analog inputs</a:t>
-            </a:r>
+              <a:t>KHz</a:t>
+            </a:r>
+            <a:endParaRPr lang="en-US" sz="1400" dirty="0"/>
           </a:p>
           <a:p>
             <a:pPr marL="285750" indent="-285750">
@@ -14016,7 +14723,7 @@
             </a:pPr>
             <a:r>
               <a:rPr lang="en-US" sz="1400" dirty="0"/>
-              <a:t>Each one is a bit different thus needs compensation</a:t>
+              <a:t>Sensitivity can be set from few centimeters to direct touch</a:t>
             </a:r>
           </a:p>
           <a:p>
@@ -14026,7 +14733,7 @@
             </a:pPr>
             <a:r>
               <a:rPr lang="en-US" sz="1400" dirty="0"/>
-              <a:t>Usage: </a:t>
+              <a:t>Interrupt driven directly to the MCU to indicate a touch</a:t>
             </a:r>
           </a:p>
           <a:p>
@@ -14035,24 +14742,42 @@
               <a:buChar char="•"/>
             </a:pPr>
             <a:r>
-              <a:rPr lang="en-US" sz="1400" dirty="0" err="1"/>
-              <a:t>analogJoyStick</a:t>
-            </a:r>
-            <a:r>
               <a:rPr lang="en-US" sz="1400" dirty="0"/>
-              <a:t> JS(JOY_X_PIN, JOY_Y_PIN, 5</a:t>
-            </a:r>
-            <a:r>
-              <a:rPr lang="en-US" sz="1400" dirty="0">
-                <a:solidFill>
-                  <a:srgbClr val="F0CE3E"/>
-                </a:solidFill>
-              </a:rPr>
-              <a:t>/*Dead Zone*/</a:t>
+              <a:t>Doesn’t need an expansive I2C read to check for a touch!</a:t>
+            </a:r>
+          </a:p>
+          <a:p>
+            <a:pPr marL="285750" indent="-285750">
+              <a:buFont typeface="Arial" panose="020B0604020202020204" pitchFamily="34" charset="0"/>
+              <a:buChar char="•"/>
+            </a:pPr>
+            <a:r>
+              <a:rPr lang="en-US" sz="1400" b="1" dirty="0"/>
+              <a:t>No</a:t>
             </a:r>
             <a:r>
               <a:rPr lang="en-US" sz="1400" dirty="0"/>
-              <a:t>);</a:t>
+              <a:t> need for a calibration process!</a:t>
+            </a:r>
+          </a:p>
+          <a:p>
+            <a:pPr marL="285750" indent="-285750">
+              <a:buFont typeface="Arial" panose="020B0604020202020204" pitchFamily="34" charset="0"/>
+              <a:buChar char="•"/>
+            </a:pPr>
+            <a:r>
+              <a:rPr lang="en-US" sz="1400" dirty="0"/>
+              <a:t>Need to call the initialization function in setup</a:t>
+            </a:r>
+          </a:p>
+          <a:p>
+            <a:pPr marL="285750" indent="-285750">
+              <a:buFont typeface="Arial" panose="020B0604020202020204" pitchFamily="34" charset="0"/>
+              <a:buChar char="•"/>
+            </a:pPr>
+            <a:r>
+              <a:rPr lang="en-US" sz="1400" dirty="0"/>
+              <a:t>Usage:</a:t>
             </a:r>
           </a:p>
           <a:p>
@@ -14061,20 +14786,16 @@
               <a:buChar char="•"/>
             </a:pPr>
             <a:r>
-              <a:rPr lang="en-US" sz="1400" dirty="0" err="1"/>
-              <a:t>JS.init</a:t>
-            </a:r>
-            <a:r>
               <a:rPr lang="en-US" sz="1400" dirty="0"/>
-              <a:t>(); </a:t>
-            </a:r>
-            <a:r>
-              <a:rPr lang="en-US" sz="1400" dirty="0">
-                <a:solidFill>
-                  <a:srgbClr val="F0CE3E"/>
-                </a:solidFill>
-              </a:rPr>
-              <a:t>// When called joy stick shouldn’t be touched!!</a:t>
+              <a:t>Check if touched: if(</a:t>
+            </a:r>
+            <a:r>
+              <a:rPr lang="en-US" sz="1400" b="1" dirty="0"/>
+              <a:t>TOUCH_PANNEL_TOUCHED</a:t>
+            </a:r>
+            <a:r>
+              <a:rPr lang="en-US" sz="1400" dirty="0"/>
+              <a:t>())…</a:t>
             </a:r>
           </a:p>
           <a:p>
@@ -14083,41 +14804,33 @@
               <a:buChar char="•"/>
             </a:pPr>
             <a:r>
-              <a:rPr lang="en-US" sz="1400" dirty="0" err="1"/>
-              <a:t>jx</a:t>
-            </a:r>
-            <a:r>
               <a:rPr lang="en-US" sz="1400" dirty="0"/>
+              <a:t>If yes: </a:t>
+            </a:r>
+            <a:r>
+              <a:rPr lang="fr-FR" sz="1400" b="1" dirty="0"/>
+              <a:t>count</a:t>
+            </a:r>
+            <a:r>
+              <a:rPr lang="fr-FR" sz="1400" dirty="0"/>
               <a:t> = </a:t>
             </a:r>
             <a:r>
-              <a:rPr lang="en-US" sz="1400" dirty="0" err="1"/>
-              <a:t>JS.readXaxis</a:t>
-            </a:r>
-            <a:r>
-              <a:rPr lang="en-US" sz="1400" dirty="0"/>
-              <a:t>(); </a:t>
-            </a:r>
-            <a:r>
-              <a:rPr lang="en-US" sz="1400" dirty="0">
-                <a:solidFill>
-                  <a:srgbClr val="F0CE3E"/>
-                </a:solidFill>
-              </a:rPr>
-              <a:t>// Read value : -2048 to +2048</a:t>
-            </a:r>
-            <a:endParaRPr lang="en-US" sz="800" dirty="0">
-              <a:solidFill>
-                <a:srgbClr val="F0CE3E"/>
-              </a:solidFill>
-            </a:endParaRPr>
+              <a:rPr lang="fr-FR" sz="1400" b="1" dirty="0" err="1"/>
+              <a:t>ts.getTouchedPoints</a:t>
+            </a:r>
+            <a:r>
+              <a:rPr lang="fr-FR" sz="1400" dirty="0"/>
+              <a:t>(&amp;x1, &amp;y1, &amp;x2, &amp;y2);</a:t>
+            </a:r>
+            <a:endParaRPr lang="en-US" sz="1400" dirty="0"/>
           </a:p>
         </p:txBody>
       </p:sp>
     </p:spTree>
     <p:extLst>
       <p:ext uri="{BB962C8B-B14F-4D97-AF65-F5344CB8AC3E}">
-        <p14:creationId xmlns:p14="http://schemas.microsoft.com/office/powerpoint/2010/main" val="3679737544"/>
+        <p14:creationId xmlns:p14="http://schemas.microsoft.com/office/powerpoint/2010/main" val="447662515"/>
       </p:ext>
     </p:extLst>
   </p:cSld>
@@ -14214,7 +14927,7 @@
           <a:p>
             <a:r>
               <a:rPr lang="en-US" dirty="0"/>
-              <a:t>The speaker (buzzer)</a:t>
+              <a:t>The joy stick</a:t>
             </a:r>
           </a:p>
         </p:txBody>
@@ -14251,7 +14964,7 @@
             </a:pPr>
             <a:r>
               <a:rPr lang="en-US" sz="1400" dirty="0"/>
-              <a:t>Uses PWM channel 0</a:t>
+              <a:t>Two axis – X and Y, both analog</a:t>
             </a:r>
           </a:p>
           <a:p>
@@ -14261,7 +14974,35 @@
             </a:pPr>
             <a:r>
               <a:rPr lang="en-US" sz="1400" dirty="0"/>
-              <a:t>Has two functions:</a:t>
+              <a:t>Using I/</a:t>
+            </a:r>
+            <a:r>
+              <a:rPr lang="en-US" sz="1400" dirty="0" err="1"/>
+              <a:t>Os</a:t>
+            </a:r>
+            <a:r>
+              <a:rPr lang="en-US" sz="1400" dirty="0"/>
+              <a:t>: 36 and 39 and analog inputs</a:t>
+            </a:r>
+          </a:p>
+          <a:p>
+            <a:pPr marL="285750" indent="-285750">
+              <a:buFont typeface="Arial" panose="020B0604020202020204" pitchFamily="34" charset="0"/>
+              <a:buChar char="•"/>
+            </a:pPr>
+            <a:r>
+              <a:rPr lang="en-US" sz="1400" dirty="0"/>
+              <a:t>Each one is a bit different thus needs compensation</a:t>
+            </a:r>
+          </a:p>
+          <a:p>
+            <a:pPr marL="285750" indent="-285750">
+              <a:buFont typeface="Arial" panose="020B0604020202020204" pitchFamily="34" charset="0"/>
+              <a:buChar char="•"/>
+            </a:pPr>
+            <a:r>
+              <a:rPr lang="en-US" sz="1400" dirty="0"/>
+              <a:t>Usage: </a:t>
             </a:r>
           </a:p>
           <a:p>
@@ -14270,58 +15011,24 @@
               <a:buChar char="•"/>
             </a:pPr>
             <a:r>
+              <a:rPr lang="en-US" sz="1400" dirty="0" err="1"/>
+              <a:t>analogJoyStick</a:t>
+            </a:r>
+            <a:r>
               <a:rPr lang="en-US" sz="1400" dirty="0"/>
-              <a:t>One blocking: void </a:t>
-            </a:r>
-            <a:r>
-              <a:rPr lang="en-US" sz="1400" b="1" dirty="0"/>
-              <a:t>sound</a:t>
-            </a:r>
-            <a:r>
-              <a:rPr lang="en-US" sz="1400" dirty="0"/>
-              <a:t>(</a:t>
-            </a:r>
-            <a:r>
-              <a:rPr lang="en-US" sz="1400" b="1" dirty="0"/>
-              <a:t>unsigned short</a:t>
-            </a:r>
-            <a:r>
-              <a:rPr lang="en-US" sz="1400" dirty="0"/>
-              <a:t> </a:t>
-            </a:r>
-            <a:r>
-              <a:rPr lang="en-US" sz="1400" dirty="0" err="1"/>
-              <a:t>freq</a:t>
-            </a:r>
-            <a:r>
-              <a:rPr lang="en-US" sz="1400" dirty="0"/>
-              <a:t>, </a:t>
-            </a:r>
-            <a:r>
-              <a:rPr lang="en-US" sz="1400" b="1" dirty="0"/>
-              <a:t>unsigned short</a:t>
-            </a:r>
-            <a:r>
-              <a:rPr lang="en-US" sz="1400" dirty="0"/>
-              <a:t> </a:t>
-            </a:r>
-            <a:r>
-              <a:rPr lang="en-US" sz="1400" dirty="0" err="1"/>
-              <a:t>timeInMilliSec</a:t>
+              <a:t> JS(JOY_X_PIN, JOY_Y_PIN, 5</a:t>
+            </a:r>
+            <a:r>
+              <a:rPr lang="en-US" sz="1400" dirty="0">
+                <a:solidFill>
+                  <a:srgbClr val="F0CE3E"/>
+                </a:solidFill>
+              </a:rPr>
+              <a:t>/*Dead Zone*/</a:t>
             </a:r>
             <a:r>
               <a:rPr lang="en-US" sz="1400" dirty="0"/>
               <a:t>);</a:t>
-            </a:r>
-          </a:p>
-          <a:p>
-            <a:pPr marL="857250" lvl="2" indent="-285750">
-              <a:buFont typeface="Arial" panose="020B0604020202020204" pitchFamily="34" charset="0"/>
-              <a:buChar char="•"/>
-            </a:pPr>
-            <a:r>
-              <a:rPr lang="en-US" sz="1400" dirty="0"/>
-              <a:t>Will play sound of frequency for a period of time, when done will return</a:t>
             </a:r>
           </a:p>
           <a:p>
@@ -14330,42 +15037,20 @@
               <a:buChar char="•"/>
             </a:pPr>
             <a:r>
+              <a:rPr lang="en-US" sz="1400" dirty="0" err="1"/>
+              <a:t>JS.init</a:t>
+            </a:r>
+            <a:r>
               <a:rPr lang="en-US" sz="1400" dirty="0"/>
-              <a:t>Second non blocking: void </a:t>
-            </a:r>
-            <a:r>
-              <a:rPr lang="en-US" sz="1400" b="1" dirty="0"/>
-              <a:t>sound</a:t>
-            </a:r>
-            <a:r>
-              <a:rPr lang="en-US" sz="1400" dirty="0"/>
-              <a:t>(</a:t>
-            </a:r>
-            <a:r>
-              <a:rPr lang="en-US" sz="1400" b="1" dirty="0"/>
-              <a:t>unsigned short</a:t>
-            </a:r>
-            <a:r>
-              <a:rPr lang="en-US" sz="1400" dirty="0"/>
-              <a:t> </a:t>
-            </a:r>
-            <a:r>
-              <a:rPr lang="en-US" sz="1400" dirty="0" err="1"/>
-              <a:t>freq</a:t>
-            </a:r>
-            <a:r>
-              <a:rPr lang="en-US" sz="1400" dirty="0"/>
-              <a:t>);</a:t>
-            </a:r>
-          </a:p>
-          <a:p>
-            <a:pPr marL="857250" lvl="2" indent="-285750">
-              <a:buFont typeface="Arial" panose="020B0604020202020204" pitchFamily="34" charset="0"/>
-              <a:buChar char="•"/>
-            </a:pPr>
-            <a:r>
-              <a:rPr lang="en-US" sz="1400" dirty="0"/>
-              <a:t>Will trigger the speaker to generate sound at specified frequency and return immediately</a:t>
+              <a:t>(); </a:t>
+            </a:r>
+            <a:r>
+              <a:rPr lang="en-US" sz="1400" dirty="0">
+                <a:solidFill>
+                  <a:srgbClr val="F0CE3E"/>
+                </a:solidFill>
+              </a:rPr>
+              <a:t>// When called joy stick shouldn’t be touched!!</a:t>
             </a:r>
           </a:p>
           <a:p>
@@ -14374,24 +15059,41 @@
               <a:buChar char="•"/>
             </a:pPr>
             <a:r>
+              <a:rPr lang="en-US" sz="1400" dirty="0" err="1"/>
+              <a:t>jx</a:t>
+            </a:r>
+            <a:r>
               <a:rPr lang="en-US" sz="1400" dirty="0"/>
-              <a:t>Call: </a:t>
-            </a:r>
-            <a:r>
-              <a:rPr lang="en-US" sz="1400" b="1" dirty="0" err="1"/>
-              <a:t>soundOff</a:t>
+              <a:t> = </a:t>
+            </a:r>
+            <a:r>
+              <a:rPr lang="en-US" sz="1400" dirty="0" err="1"/>
+              <a:t>JS.readXaxis</a:t>
             </a:r>
             <a:r>
               <a:rPr lang="en-US" sz="1400" dirty="0"/>
-              <a:t>(); to shut off the speaker</a:t>
-            </a:r>
+              <a:t>(); </a:t>
+            </a:r>
+            <a:r>
+              <a:rPr lang="en-US" sz="1400" dirty="0">
+                <a:solidFill>
+                  <a:srgbClr val="F0CE3E"/>
+                </a:solidFill>
+              </a:rPr>
+              <a:t>// Read value : -2048 to +2048</a:t>
+            </a:r>
+            <a:endParaRPr lang="en-US" sz="800" dirty="0">
+              <a:solidFill>
+                <a:srgbClr val="F0CE3E"/>
+              </a:solidFill>
+            </a:endParaRPr>
           </a:p>
         </p:txBody>
       </p:sp>
     </p:spTree>
     <p:extLst>
       <p:ext uri="{BB962C8B-B14F-4D97-AF65-F5344CB8AC3E}">
-        <p14:creationId xmlns:p14="http://schemas.microsoft.com/office/powerpoint/2010/main" val="2179871560"/>
+        <p14:creationId xmlns:p14="http://schemas.microsoft.com/office/powerpoint/2010/main" val="3679737544"/>
       </p:ext>
     </p:extLst>
   </p:cSld>
@@ -14435,7 +15137,7 @@
           <p:cNvPr id="2" name="Slide Number Placeholder 1">
             <a:extLst>
               <a:ext uri="{FF2B5EF4-FFF2-40B4-BE49-F238E27FC236}">
-                <a16:creationId xmlns:a16="http://schemas.microsoft.com/office/drawing/2014/main" id="{7E1D16A4-31DE-4D37-B962-AD0C63D87BBD}"/>
+                <a16:creationId xmlns:a16="http://schemas.microsoft.com/office/drawing/2014/main" id="{D356F11F-1EB0-4A6D-A2A2-3CFE85E99179}"/>
               </a:ext>
             </a:extLst>
           </p:cNvPr>
@@ -14465,7 +15167,7 @@
           <p:cNvPr id="3" name="Title 2">
             <a:extLst>
               <a:ext uri="{FF2B5EF4-FFF2-40B4-BE49-F238E27FC236}">
-                <a16:creationId xmlns:a16="http://schemas.microsoft.com/office/drawing/2014/main" id="{35AF5E40-A4CD-4FF0-AE17-8D71B32BA628}"/>
+                <a16:creationId xmlns:a16="http://schemas.microsoft.com/office/drawing/2014/main" id="{DB94123A-6FE7-4D27-9D28-AA73B35C79A8}"/>
               </a:ext>
             </a:extLst>
           </p:cNvPr>
@@ -14478,8 +15180,8 @@
         </p:nvSpPr>
         <p:spPr>
           <a:xfrm>
-            <a:off x="455613" y="308848"/>
-            <a:ext cx="8229600" cy="362896"/>
+            <a:off x="454025" y="111998"/>
+            <a:ext cx="8229600" cy="357902"/>
           </a:xfrm>
         </p:spPr>
         <p:txBody>
@@ -14488,7 +15190,7 @@
           <a:p>
             <a:r>
               <a:rPr lang="en-US" dirty="0"/>
-              <a:t>The arcade team’s targets:</a:t>
+              <a:t>The speaker (buzzer)</a:t>
             </a:r>
           </a:p>
         </p:txBody>
@@ -14498,7 +15200,7 @@
           <p:cNvPr id="4" name="Content Placeholder 3">
             <a:extLst>
               <a:ext uri="{FF2B5EF4-FFF2-40B4-BE49-F238E27FC236}">
-                <a16:creationId xmlns:a16="http://schemas.microsoft.com/office/drawing/2014/main" id="{EAEE4C79-B6AC-4678-8638-ABCEC8EFA081}"/>
+                <a16:creationId xmlns:a16="http://schemas.microsoft.com/office/drawing/2014/main" id="{A1DD0B1D-0C34-4ABD-9C21-20EB9E7594CB}"/>
               </a:ext>
             </a:extLst>
           </p:cNvPr>
@@ -14511,8 +15213,8 @@
         </p:nvSpPr>
         <p:spPr>
           <a:xfrm>
-            <a:off x="455613" y="707255"/>
-            <a:ext cx="8228012" cy="3921896"/>
+            <a:off x="455613" y="533401"/>
+            <a:ext cx="8228012" cy="4095750"/>
           </a:xfrm>
         </p:spPr>
         <p:txBody>
@@ -14520,333 +15222,152 @@
           <a:lstStyle/>
           <a:p>
             <a:pPr marL="285750" indent="-285750">
-              <a:spcBef>
-                <a:spcPts val="600"/>
-              </a:spcBef>
               <a:buFont typeface="Arial" panose="020B0604020202020204" pitchFamily="34" charset="0"/>
               <a:buChar char="•"/>
             </a:pPr>
             <a:r>
               <a:rPr lang="en-US" sz="1400" dirty="0"/>
-              <a:t>Expand our graphics library to make it easier to code games</a:t>
+              <a:t>Uses PWM channel 0</a:t>
             </a:r>
           </a:p>
           <a:p>
             <a:pPr marL="285750" indent="-285750">
-              <a:spcBef>
-                <a:spcPts val="600"/>
-              </a:spcBef>
               <a:buFont typeface="Arial" panose="020B0604020202020204" pitchFamily="34" charset="0"/>
               <a:buChar char="•"/>
             </a:pPr>
             <a:r>
               <a:rPr lang="en-US" sz="1400" dirty="0"/>
-              <a:t>Improve the graphics library’s performance (use dual core?)</a:t>
-            </a:r>
-          </a:p>
-          <a:p>
-            <a:pPr marL="285750" indent="-285750">
-              <a:spcBef>
-                <a:spcPts val="600"/>
-              </a:spcBef>
+              <a:t>Has two functions:</a:t>
+            </a:r>
+          </a:p>
+          <a:p>
+            <a:pPr marL="511175" lvl="1" indent="-285750">
               <a:buFont typeface="Arial" panose="020B0604020202020204" pitchFamily="34" charset="0"/>
               <a:buChar char="•"/>
             </a:pPr>
             <a:r>
               <a:rPr lang="en-US" sz="1400" dirty="0"/>
-              <a:t>Define and code sound generating functions for games </a:t>
-            </a:r>
-          </a:p>
-          <a:p>
-            <a:pPr marL="285750" indent="-285750">
-              <a:spcBef>
-                <a:spcPts val="600"/>
-              </a:spcBef>
+              <a:t>One blocking: void </a:t>
+            </a:r>
+            <a:r>
+              <a:rPr lang="en-US" sz="1400" b="1" dirty="0"/>
+              <a:t>sound</a:t>
+            </a:r>
+            <a:r>
+              <a:rPr lang="en-US" sz="1400" dirty="0"/>
+              <a:t>(</a:t>
+            </a:r>
+            <a:r>
+              <a:rPr lang="en-US" sz="1400" b="1" dirty="0"/>
+              <a:t>unsigned short</a:t>
+            </a:r>
+            <a:r>
+              <a:rPr lang="en-US" sz="1400" dirty="0"/>
+              <a:t> </a:t>
+            </a:r>
+            <a:r>
+              <a:rPr lang="en-US" sz="1400" dirty="0" err="1"/>
+              <a:t>freq</a:t>
+            </a:r>
+            <a:r>
+              <a:rPr lang="en-US" sz="1400" dirty="0"/>
+              <a:t>, </a:t>
+            </a:r>
+            <a:r>
+              <a:rPr lang="en-US" sz="1400" b="1" dirty="0"/>
+              <a:t>unsigned short</a:t>
+            </a:r>
+            <a:r>
+              <a:rPr lang="en-US" sz="1400" dirty="0"/>
+              <a:t> </a:t>
+            </a:r>
+            <a:r>
+              <a:rPr lang="en-US" sz="1400" dirty="0" err="1"/>
+              <a:t>timeInMilliSec</a:t>
+            </a:r>
+            <a:r>
+              <a:rPr lang="en-US" sz="1400" dirty="0"/>
+              <a:t>);</a:t>
+            </a:r>
+          </a:p>
+          <a:p>
+            <a:pPr marL="857250" lvl="2" indent="-285750">
               <a:buFont typeface="Arial" panose="020B0604020202020204" pitchFamily="34" charset="0"/>
               <a:buChar char="•"/>
             </a:pPr>
             <a:r>
               <a:rPr lang="en-US" sz="1400" dirty="0"/>
-              <a:t>To code few games:</a:t>
+              <a:t>Will play sound of frequency for a period of time, when done will return</a:t>
             </a:r>
           </a:p>
           <a:p>
             <a:pPr marL="511175" lvl="1" indent="-285750">
-              <a:spcBef>
-                <a:spcPts val="600"/>
-              </a:spcBef>
               <a:buFont typeface="Arial" panose="020B0604020202020204" pitchFamily="34" charset="0"/>
               <a:buChar char="•"/>
             </a:pPr>
             <a:r>
               <a:rPr lang="en-US" sz="1400" dirty="0"/>
-              <a:t>Pacman (with a twist?)</a:t>
-            </a:r>
-          </a:p>
-          <a:p>
-            <a:pPr marL="511175" lvl="1" indent="-285750">
-              <a:spcBef>
-                <a:spcPts val="600"/>
-              </a:spcBef>
+              <a:t>Second non blocking: void </a:t>
+            </a:r>
+            <a:r>
+              <a:rPr lang="en-US" sz="1400" b="1" dirty="0"/>
+              <a:t>sound</a:t>
+            </a:r>
+            <a:r>
+              <a:rPr lang="en-US" sz="1400" dirty="0"/>
+              <a:t>(</a:t>
+            </a:r>
+            <a:r>
+              <a:rPr lang="en-US" sz="1400" b="1" dirty="0"/>
+              <a:t>unsigned short</a:t>
+            </a:r>
+            <a:r>
+              <a:rPr lang="en-US" sz="1400" dirty="0"/>
+              <a:t> </a:t>
+            </a:r>
+            <a:r>
+              <a:rPr lang="en-US" sz="1400" dirty="0" err="1"/>
+              <a:t>freq</a:t>
+            </a:r>
+            <a:r>
+              <a:rPr lang="en-US" sz="1400" dirty="0"/>
+              <a:t>);</a:t>
+            </a:r>
+          </a:p>
+          <a:p>
+            <a:pPr marL="857250" lvl="2" indent="-285750">
               <a:buFont typeface="Arial" panose="020B0604020202020204" pitchFamily="34" charset="0"/>
               <a:buChar char="•"/>
             </a:pPr>
             <a:r>
               <a:rPr lang="en-US" sz="1400" dirty="0"/>
-              <a:t>Space invaders (basic code exists)</a:t>
+              <a:t>Will trigger the speaker to generate sound at specified frequency and return immediately</a:t>
             </a:r>
           </a:p>
           <a:p>
             <a:pPr marL="511175" lvl="1" indent="-285750">
-              <a:spcBef>
-                <a:spcPts val="600"/>
-              </a:spcBef>
               <a:buFont typeface="Arial" panose="020B0604020202020204" pitchFamily="34" charset="0"/>
               <a:buChar char="•"/>
             </a:pPr>
             <a:r>
               <a:rPr lang="en-US" sz="1400" dirty="0"/>
-              <a:t>Car racing</a:t>
-            </a:r>
-          </a:p>
-          <a:p>
-            <a:pPr marL="511175" lvl="1" indent="-285750">
-              <a:spcBef>
-                <a:spcPts val="600"/>
-              </a:spcBef>
-              <a:buFont typeface="Arial" panose="020B0604020202020204" pitchFamily="34" charset="0"/>
-              <a:buChar char="•"/>
-            </a:pPr>
+              <a:t>Call: </a:t>
+            </a:r>
+            <a:r>
+              <a:rPr lang="en-US" sz="1400" b="1" dirty="0" err="1"/>
+              <a:t>soundOff</a:t>
+            </a:r>
             <a:r>
               <a:rPr lang="en-US" sz="1400" dirty="0"/>
-              <a:t>One of our owns </a:t>
-            </a:r>
-            <a:r>
-              <a:rPr lang="en-US" sz="1400" dirty="0">
-                <a:sym typeface="Wingdings" panose="05000000000000000000" pitchFamily="2" charset="2"/>
-              </a:rPr>
-              <a:t></a:t>
-            </a:r>
-            <a:r>
-              <a:rPr lang="en-US" sz="1400" dirty="0"/>
-              <a:t> </a:t>
-            </a:r>
-          </a:p>
-          <a:p>
-            <a:pPr marL="285750" indent="-285750">
-              <a:spcBef>
-                <a:spcPts val="600"/>
-              </a:spcBef>
-              <a:buFont typeface="Arial" panose="020B0604020202020204" pitchFamily="34" charset="0"/>
-              <a:buChar char="•"/>
-            </a:pPr>
-            <a:r>
-              <a:rPr lang="en-US" sz="1400" dirty="0"/>
-              <a:t>To define a unique controller, design it and manufacture it</a:t>
-            </a:r>
-          </a:p>
-          <a:p>
-            <a:pPr>
-              <a:spcBef>
-                <a:spcPts val="600"/>
-              </a:spcBef>
-            </a:pPr>
-            <a:endParaRPr lang="en-US" sz="1400" dirty="0"/>
-          </a:p>
-        </p:txBody>
-      </p:sp>
-      <p:pic>
-        <p:nvPicPr>
-          <p:cNvPr id="1026" name="Picture 2" descr="Related image">
-            <a:extLst>
-              <a:ext uri="{FF2B5EF4-FFF2-40B4-BE49-F238E27FC236}">
-                <a16:creationId xmlns:a16="http://schemas.microsoft.com/office/drawing/2014/main" id="{F61458DD-CFAE-468B-9892-55E52CF4976F}"/>
-              </a:ext>
-            </a:extLst>
-          </p:cNvPr>
-          <p:cNvPicPr>
-            <a:picLocks noChangeAspect="1" noChangeArrowheads="1"/>
-          </p:cNvPicPr>
-          <p:nvPr/>
-        </p:nvPicPr>
-        <p:blipFill>
-          <a:blip r:embed="rId2">
-            <a:extLst>
-              <a:ext uri="{28A0092B-C50C-407E-A947-70E740481C1C}">
-                <a14:useLocalDpi xmlns:a14="http://schemas.microsoft.com/office/drawing/2010/main" val="0"/>
-              </a:ext>
-            </a:extLst>
-          </a:blip>
-          <a:srcRect/>
-          <a:stretch>
-            <a:fillRect/>
-          </a:stretch>
-        </p:blipFill>
-        <p:spPr bwMode="auto">
-          <a:xfrm>
-            <a:off x="6474782" y="308848"/>
-            <a:ext cx="2000434" cy="1500326"/>
-          </a:xfrm>
-          <a:prstGeom prst="rect">
-            <a:avLst/>
-          </a:prstGeom>
-          <a:noFill/>
-          <a:extLst>
-            <a:ext uri="{909E8E84-426E-40DD-AFC4-6F175D3DCCD1}">
-              <a14:hiddenFill xmlns:a14="http://schemas.microsoft.com/office/drawing/2010/main">
-                <a:solidFill>
-                  <a:srgbClr val="FFFFFF"/>
-                </a:solidFill>
-              </a14:hiddenFill>
-            </a:ext>
-          </a:extLst>
-        </p:spPr>
-      </p:pic>
-      <p:pic>
-        <p:nvPicPr>
-          <p:cNvPr id="1028" name="Picture 4" descr="Image result for space invaders">
-            <a:extLst>
-              <a:ext uri="{FF2B5EF4-FFF2-40B4-BE49-F238E27FC236}">
-                <a16:creationId xmlns:a16="http://schemas.microsoft.com/office/drawing/2014/main" id="{BB59DDFA-3B87-4B4B-86AC-61F8C9E98396}"/>
-              </a:ext>
-            </a:extLst>
-          </p:cNvPr>
-          <p:cNvPicPr>
-            <a:picLocks noChangeAspect="1" noChangeArrowheads="1"/>
-          </p:cNvPicPr>
-          <p:nvPr/>
-        </p:nvPicPr>
-        <p:blipFill>
-          <a:blip r:embed="rId3">
-            <a:extLst>
-              <a:ext uri="{28A0092B-C50C-407E-A947-70E740481C1C}">
-                <a14:useLocalDpi xmlns:a14="http://schemas.microsoft.com/office/drawing/2010/main" val="0"/>
-              </a:ext>
-            </a:extLst>
-          </a:blip>
-          <a:srcRect/>
-          <a:stretch>
-            <a:fillRect/>
-          </a:stretch>
-        </p:blipFill>
-        <p:spPr bwMode="auto">
-          <a:xfrm>
-            <a:off x="6478937" y="2154315"/>
-            <a:ext cx="1996277" cy="1605007"/>
-          </a:xfrm>
-          <a:prstGeom prst="rect">
-            <a:avLst/>
-          </a:prstGeom>
-          <a:noFill/>
-          <a:extLst>
-            <a:ext uri="{909E8E84-426E-40DD-AFC4-6F175D3DCCD1}">
-              <a14:hiddenFill xmlns:a14="http://schemas.microsoft.com/office/drawing/2010/main">
-                <a:solidFill>
-                  <a:srgbClr val="FFFFFF"/>
-                </a:solidFill>
-              </a14:hiddenFill>
-            </a:ext>
-          </a:extLst>
-        </p:spPr>
-      </p:pic>
-      <p:pic>
-        <p:nvPicPr>
-          <p:cNvPr id="1030" name="Picture 6" descr="Image result for arcade car games">
-            <a:extLst>
-              <a:ext uri="{FF2B5EF4-FFF2-40B4-BE49-F238E27FC236}">
-                <a16:creationId xmlns:a16="http://schemas.microsoft.com/office/drawing/2014/main" id="{52A4CD35-B7D8-47AA-B9E3-99B9A9A21082}"/>
-              </a:ext>
-            </a:extLst>
-          </p:cNvPr>
-          <p:cNvPicPr>
-            <a:picLocks noChangeAspect="1" noChangeArrowheads="1"/>
-          </p:cNvPicPr>
-          <p:nvPr/>
-        </p:nvPicPr>
-        <p:blipFill>
-          <a:blip r:embed="rId4">
-            <a:extLst>
-              <a:ext uri="{28A0092B-C50C-407E-A947-70E740481C1C}">
-                <a14:useLocalDpi xmlns:a14="http://schemas.microsoft.com/office/drawing/2010/main" val="0"/>
-              </a:ext>
-            </a:extLst>
-          </a:blip>
-          <a:srcRect/>
-          <a:stretch>
-            <a:fillRect/>
-          </a:stretch>
-        </p:blipFill>
-        <p:spPr bwMode="auto">
-          <a:xfrm>
-            <a:off x="3991993" y="3440644"/>
-            <a:ext cx="1519515" cy="1089464"/>
-          </a:xfrm>
-          <a:prstGeom prst="rect">
-            <a:avLst/>
-          </a:prstGeom>
-          <a:noFill/>
-          <a:extLst>
-            <a:ext uri="{909E8E84-426E-40DD-AFC4-6F175D3DCCD1}">
-              <a14:hiddenFill xmlns:a14="http://schemas.microsoft.com/office/drawing/2010/main">
-                <a:solidFill>
-                  <a:srgbClr val="FFFFFF"/>
-                </a:solidFill>
-              </a14:hiddenFill>
-            </a:ext>
-          </a:extLst>
-        </p:spPr>
-      </p:pic>
-      <p:pic>
-        <p:nvPicPr>
-          <p:cNvPr id="1032" name="Picture 8" descr="Image result for arcade car games">
-            <a:extLst>
-              <a:ext uri="{FF2B5EF4-FFF2-40B4-BE49-F238E27FC236}">
-                <a16:creationId xmlns:a16="http://schemas.microsoft.com/office/drawing/2014/main" id="{52A89524-ABEF-4F9A-B02F-ECCBC1CA7150}"/>
-              </a:ext>
-            </a:extLst>
-          </p:cNvPr>
-          <p:cNvPicPr>
-            <a:picLocks noChangeAspect="1" noChangeArrowheads="1"/>
-          </p:cNvPicPr>
-          <p:nvPr/>
-        </p:nvPicPr>
-        <p:blipFill>
-          <a:blip r:embed="rId5">
-            <a:extLst>
-              <a:ext uri="{28A0092B-C50C-407E-A947-70E740481C1C}">
-                <a14:useLocalDpi xmlns:a14="http://schemas.microsoft.com/office/drawing/2010/main" val="0"/>
-              </a:ext>
-            </a:extLst>
-          </a:blip>
-          <a:srcRect/>
-          <a:stretch>
-            <a:fillRect/>
-          </a:stretch>
-        </p:blipFill>
-        <p:spPr bwMode="auto">
-          <a:xfrm>
-            <a:off x="2205560" y="3440644"/>
-            <a:ext cx="1454491" cy="1089464"/>
-          </a:xfrm>
-          <a:prstGeom prst="rect">
-            <a:avLst/>
-          </a:prstGeom>
-          <a:noFill/>
-          <a:extLst>
-            <a:ext uri="{909E8E84-426E-40DD-AFC4-6F175D3DCCD1}">
-              <a14:hiddenFill xmlns:a14="http://schemas.microsoft.com/office/drawing/2010/main">
-                <a:solidFill>
-                  <a:srgbClr val="FFFFFF"/>
-                </a:solidFill>
-              </a14:hiddenFill>
-            </a:ext>
-          </a:extLst>
-        </p:spPr>
-      </p:pic>
+              <a:t>(); to shut off the speaker</a:t>
+            </a:r>
+          </a:p>
+        </p:txBody>
+      </p:sp>
     </p:spTree>
     <p:extLst>
       <p:ext uri="{BB962C8B-B14F-4D97-AF65-F5344CB8AC3E}">
-        <p14:creationId xmlns:p14="http://schemas.microsoft.com/office/powerpoint/2010/main" val="983960078"/>
+        <p14:creationId xmlns:p14="http://schemas.microsoft.com/office/powerpoint/2010/main" val="2179871560"/>
       </p:ext>
     </p:extLst>
   </p:cSld>
@@ -14943,7 +15464,7 @@
           <a:p>
             <a:r>
               <a:rPr lang="en-US" dirty="0"/>
-              <a:t>The drone team’s targets:</a:t>
+              <a:t>The arcade team’s targets:</a:t>
             </a:r>
           </a:p>
         </p:txBody>
@@ -14983,7 +15504,46 @@
             </a:pPr>
             <a:r>
               <a:rPr lang="en-US" sz="1400" dirty="0"/>
-              <a:t>Design and build a complete drone</a:t>
+              <a:t>Expand our graphics library to make it easier to code games</a:t>
+            </a:r>
+          </a:p>
+          <a:p>
+            <a:pPr marL="285750" indent="-285750">
+              <a:spcBef>
+                <a:spcPts val="600"/>
+              </a:spcBef>
+              <a:buFont typeface="Arial" panose="020B0604020202020204" pitchFamily="34" charset="0"/>
+              <a:buChar char="•"/>
+            </a:pPr>
+            <a:r>
+              <a:rPr lang="en-US" sz="1400" dirty="0"/>
+              <a:t>Improve the graphics library’s performance (use dual core?)</a:t>
+            </a:r>
+          </a:p>
+          <a:p>
+            <a:pPr marL="285750" indent="-285750">
+              <a:spcBef>
+                <a:spcPts val="600"/>
+              </a:spcBef>
+              <a:buFont typeface="Arial" panose="020B0604020202020204" pitchFamily="34" charset="0"/>
+              <a:buChar char="•"/>
+            </a:pPr>
+            <a:r>
+              <a:rPr lang="en-US" sz="1400" dirty="0"/>
+              <a:t>Define and code sound generating functions for games </a:t>
+            </a:r>
+          </a:p>
+          <a:p>
+            <a:pPr marL="285750" indent="-285750">
+              <a:spcBef>
+                <a:spcPts val="600"/>
+              </a:spcBef>
+              <a:buFont typeface="Arial" panose="020B0604020202020204" pitchFamily="34" charset="0"/>
+              <a:buChar char="•"/>
+            </a:pPr>
+            <a:r>
+              <a:rPr lang="en-US" sz="1400" dirty="0"/>
+              <a:t>To code few games:</a:t>
             </a:r>
           </a:p>
           <a:p>
@@ -14996,7 +15556,7 @@
             </a:pPr>
             <a:r>
               <a:rPr lang="en-US" sz="1400" dirty="0"/>
-              <a:t>Design and manufacture the board controlling the drone</a:t>
+              <a:t>Pacman (with a twist?)</a:t>
             </a:r>
           </a:p>
           <a:p>
@@ -15009,7 +15569,7 @@
             </a:pPr>
             <a:r>
               <a:rPr lang="en-US" sz="1400" dirty="0"/>
-              <a:t>3D design and print the chassis </a:t>
+              <a:t>Space invaders (basic code exists)</a:t>
             </a:r>
           </a:p>
           <a:p>
@@ -15022,7 +15582,30 @@
             </a:pPr>
             <a:r>
               <a:rPr lang="en-US" sz="1400" dirty="0"/>
-              <a:t>Code the drones flight control SW</a:t>
+              <a:t>Car racing</a:t>
+            </a:r>
+          </a:p>
+          <a:p>
+            <a:pPr marL="511175" lvl="1" indent="-285750">
+              <a:spcBef>
+                <a:spcPts val="600"/>
+              </a:spcBef>
+              <a:buFont typeface="Arial" panose="020B0604020202020204" pitchFamily="34" charset="0"/>
+              <a:buChar char="•"/>
+            </a:pPr>
+            <a:r>
+              <a:rPr lang="en-US" sz="1400" dirty="0"/>
+              <a:t>One of our owns </a:t>
+            </a:r>
+            <a:r>
+              <a:rPr lang="en-US" sz="1400" dirty="0">
+                <a:sym typeface="Wingdings" panose="05000000000000000000" pitchFamily="2" charset="2"/>
+              </a:rPr>
+              <a:t></a:t>
+            </a:r>
+            <a:r>
+              <a:rPr lang="en-US" sz="1400" dirty="0"/>
+              <a:t> </a:t>
             </a:r>
           </a:p>
           <a:p>
@@ -15035,17 +15618,8 @@
             </a:pPr>
             <a:r>
               <a:rPr lang="en-US" sz="1400" dirty="0"/>
-              <a:t>The Arcade team will code the remote controller using our platform </a:t>
-            </a:r>
-          </a:p>
-          <a:p>
-            <a:pPr lvl="1" indent="0">
-              <a:spcBef>
-                <a:spcPts val="600"/>
-              </a:spcBef>
-              <a:buNone/>
-            </a:pPr>
-            <a:endParaRPr lang="en-US" sz="1400" dirty="0"/>
+              <a:t>To define a unique controller, design it and manufacture it</a:t>
+            </a:r>
           </a:p>
           <a:p>
             <a:pPr>
@@ -15059,68 +15633,196 @@
       </p:sp>
       <p:pic>
         <p:nvPicPr>
-          <p:cNvPr id="5" name="Picture 4">
+          <p:cNvPr id="1026" name="Picture 2" descr="Related image">
             <a:extLst>
               <a:ext uri="{FF2B5EF4-FFF2-40B4-BE49-F238E27FC236}">
-                <a16:creationId xmlns:a16="http://schemas.microsoft.com/office/drawing/2014/main" id="{B28C07B9-C389-4857-AECF-5DE60DBFED4A}"/>
+                <a16:creationId xmlns:a16="http://schemas.microsoft.com/office/drawing/2014/main" id="{F61458DD-CFAE-468B-9892-55E52CF4976F}"/>
               </a:ext>
             </a:extLst>
           </p:cNvPr>
           <p:cNvPicPr>
-            <a:picLocks noChangeAspect="1"/>
+            <a:picLocks noChangeAspect="1" noChangeArrowheads="1"/>
           </p:cNvPicPr>
           <p:nvPr/>
         </p:nvPicPr>
         <p:blipFill>
-          <a:blip r:embed="rId2"/>
+          <a:blip r:embed="rId2">
+            <a:extLst>
+              <a:ext uri="{28A0092B-C50C-407E-A947-70E740481C1C}">
+                <a14:useLocalDpi xmlns:a14="http://schemas.microsoft.com/office/drawing/2010/main" val="0"/>
+              </a:ext>
+            </a:extLst>
+          </a:blip>
+          <a:srcRect/>
           <a:stretch>
             <a:fillRect/>
           </a:stretch>
         </p:blipFill>
-        <p:spPr>
-          <a:xfrm>
-            <a:off x="6248675" y="212395"/>
-            <a:ext cx="2810070" cy="2359355"/>
+        <p:spPr bwMode="auto">
+          <a:xfrm>
+            <a:off x="6474782" y="308848"/>
+            <a:ext cx="2000434" cy="1500326"/>
           </a:xfrm>
           <a:prstGeom prst="rect">
             <a:avLst/>
           </a:prstGeom>
+          <a:noFill/>
+          <a:extLst>
+            <a:ext uri="{909E8E84-426E-40DD-AFC4-6F175D3DCCD1}">
+              <a14:hiddenFill xmlns:a14="http://schemas.microsoft.com/office/drawing/2010/main">
+                <a:solidFill>
+                  <a:srgbClr val="FFFFFF"/>
+                </a:solidFill>
+              </a14:hiddenFill>
+            </a:ext>
+          </a:extLst>
         </p:spPr>
       </p:pic>
       <p:pic>
         <p:nvPicPr>
-          <p:cNvPr id="6" name="Picture 5">
+          <p:cNvPr id="1028" name="Picture 4" descr="Image result for space invaders">
             <a:extLst>
               <a:ext uri="{FF2B5EF4-FFF2-40B4-BE49-F238E27FC236}">
-                <a16:creationId xmlns:a16="http://schemas.microsoft.com/office/drawing/2014/main" id="{E6689AB0-5197-4205-9851-8D5F56DCC70A}"/>
+                <a16:creationId xmlns:a16="http://schemas.microsoft.com/office/drawing/2014/main" id="{BB59DDFA-3B87-4B4B-86AC-61F8C9E98396}"/>
               </a:ext>
             </a:extLst>
           </p:cNvPr>
           <p:cNvPicPr>
-            <a:picLocks noChangeAspect="1"/>
+            <a:picLocks noChangeAspect="1" noChangeArrowheads="1"/>
           </p:cNvPicPr>
           <p:nvPr/>
         </p:nvPicPr>
         <p:blipFill>
-          <a:blip r:embed="rId3"/>
+          <a:blip r:embed="rId3">
+            <a:extLst>
+              <a:ext uri="{28A0092B-C50C-407E-A947-70E740481C1C}">
+                <a14:useLocalDpi xmlns:a14="http://schemas.microsoft.com/office/drawing/2010/main" val="0"/>
+              </a:ext>
+            </a:extLst>
+          </a:blip>
+          <a:srcRect/>
           <a:stretch>
             <a:fillRect/>
           </a:stretch>
         </p:blipFill>
-        <p:spPr>
-          <a:xfrm>
-            <a:off x="1758950" y="2340387"/>
-            <a:ext cx="3597664" cy="1995291"/>
+        <p:spPr bwMode="auto">
+          <a:xfrm>
+            <a:off x="6478937" y="2154315"/>
+            <a:ext cx="1996277" cy="1605007"/>
           </a:xfrm>
           <a:prstGeom prst="rect">
             <a:avLst/>
           </a:prstGeom>
+          <a:noFill/>
+          <a:extLst>
+            <a:ext uri="{909E8E84-426E-40DD-AFC4-6F175D3DCCD1}">
+              <a14:hiddenFill xmlns:a14="http://schemas.microsoft.com/office/drawing/2010/main">
+                <a:solidFill>
+                  <a:srgbClr val="FFFFFF"/>
+                </a:solidFill>
+              </a14:hiddenFill>
+            </a:ext>
+          </a:extLst>
+        </p:spPr>
+      </p:pic>
+      <p:pic>
+        <p:nvPicPr>
+          <p:cNvPr id="1030" name="Picture 6" descr="Image result for arcade car games">
+            <a:extLst>
+              <a:ext uri="{FF2B5EF4-FFF2-40B4-BE49-F238E27FC236}">
+                <a16:creationId xmlns:a16="http://schemas.microsoft.com/office/drawing/2014/main" id="{52A4CD35-B7D8-47AA-B9E3-99B9A9A21082}"/>
+              </a:ext>
+            </a:extLst>
+          </p:cNvPr>
+          <p:cNvPicPr>
+            <a:picLocks noChangeAspect="1" noChangeArrowheads="1"/>
+          </p:cNvPicPr>
+          <p:nvPr/>
+        </p:nvPicPr>
+        <p:blipFill>
+          <a:blip r:embed="rId4">
+            <a:extLst>
+              <a:ext uri="{28A0092B-C50C-407E-A947-70E740481C1C}">
+                <a14:useLocalDpi xmlns:a14="http://schemas.microsoft.com/office/drawing/2010/main" val="0"/>
+              </a:ext>
+            </a:extLst>
+          </a:blip>
+          <a:srcRect/>
+          <a:stretch>
+            <a:fillRect/>
+          </a:stretch>
+        </p:blipFill>
+        <p:spPr bwMode="auto">
+          <a:xfrm>
+            <a:off x="3991993" y="3440644"/>
+            <a:ext cx="1519515" cy="1089464"/>
+          </a:xfrm>
+          <a:prstGeom prst="rect">
+            <a:avLst/>
+          </a:prstGeom>
+          <a:noFill/>
+          <a:extLst>
+            <a:ext uri="{909E8E84-426E-40DD-AFC4-6F175D3DCCD1}">
+              <a14:hiddenFill xmlns:a14="http://schemas.microsoft.com/office/drawing/2010/main">
+                <a:solidFill>
+                  <a:srgbClr val="FFFFFF"/>
+                </a:solidFill>
+              </a14:hiddenFill>
+            </a:ext>
+          </a:extLst>
+        </p:spPr>
+      </p:pic>
+      <p:pic>
+        <p:nvPicPr>
+          <p:cNvPr id="1032" name="Picture 8" descr="Image result for arcade car games">
+            <a:extLst>
+              <a:ext uri="{FF2B5EF4-FFF2-40B4-BE49-F238E27FC236}">
+                <a16:creationId xmlns:a16="http://schemas.microsoft.com/office/drawing/2014/main" id="{52A89524-ABEF-4F9A-B02F-ECCBC1CA7150}"/>
+              </a:ext>
+            </a:extLst>
+          </p:cNvPr>
+          <p:cNvPicPr>
+            <a:picLocks noChangeAspect="1" noChangeArrowheads="1"/>
+          </p:cNvPicPr>
+          <p:nvPr/>
+        </p:nvPicPr>
+        <p:blipFill>
+          <a:blip r:embed="rId5">
+            <a:extLst>
+              <a:ext uri="{28A0092B-C50C-407E-A947-70E740481C1C}">
+                <a14:useLocalDpi xmlns:a14="http://schemas.microsoft.com/office/drawing/2010/main" val="0"/>
+              </a:ext>
+            </a:extLst>
+          </a:blip>
+          <a:srcRect/>
+          <a:stretch>
+            <a:fillRect/>
+          </a:stretch>
+        </p:blipFill>
+        <p:spPr bwMode="auto">
+          <a:xfrm>
+            <a:off x="2205560" y="3440644"/>
+            <a:ext cx="1454491" cy="1089464"/>
+          </a:xfrm>
+          <a:prstGeom prst="rect">
+            <a:avLst/>
+          </a:prstGeom>
+          <a:noFill/>
+          <a:extLst>
+            <a:ext uri="{909E8E84-426E-40DD-AFC4-6F175D3DCCD1}">
+              <a14:hiddenFill xmlns:a14="http://schemas.microsoft.com/office/drawing/2010/main">
+                <a:solidFill>
+                  <a:srgbClr val="FFFFFF"/>
+                </a:solidFill>
+              </a14:hiddenFill>
+            </a:ext>
+          </a:extLst>
         </p:spPr>
       </p:pic>
     </p:spTree>
     <p:extLst>
       <p:ext uri="{BB962C8B-B14F-4D97-AF65-F5344CB8AC3E}">
-        <p14:creationId xmlns:p14="http://schemas.microsoft.com/office/powerpoint/2010/main" val="696355906"/>
+        <p14:creationId xmlns:p14="http://schemas.microsoft.com/office/powerpoint/2010/main" val="983960078"/>
       </p:ext>
     </p:extLst>
   </p:cSld>
@@ -15206,7 +15908,7 @@
           <p:cNvPr id="2" name="Slide Number Placeholder 1">
             <a:extLst>
               <a:ext uri="{FF2B5EF4-FFF2-40B4-BE49-F238E27FC236}">
-                <a16:creationId xmlns:a16="http://schemas.microsoft.com/office/drawing/2014/main" id="{EC15537B-EBF1-40F0-884A-8C6B3D25FF1D}"/>
+                <a16:creationId xmlns:a16="http://schemas.microsoft.com/office/drawing/2014/main" id="{7E1D16A4-31DE-4D37-B962-AD0C63D87BBD}"/>
               </a:ext>
             </a:extLst>
           </p:cNvPr>
@@ -15236,7 +15938,7 @@
           <p:cNvPr id="3" name="Title 2">
             <a:extLst>
               <a:ext uri="{FF2B5EF4-FFF2-40B4-BE49-F238E27FC236}">
-                <a16:creationId xmlns:a16="http://schemas.microsoft.com/office/drawing/2014/main" id="{5DE3C098-505A-4287-AF6E-9C8601CEF656}"/>
+                <a16:creationId xmlns:a16="http://schemas.microsoft.com/office/drawing/2014/main" id="{35AF5E40-A4CD-4FF0-AE17-8D71B32BA628}"/>
               </a:ext>
             </a:extLst>
           </p:cNvPr>
@@ -15250,7 +15952,7 @@
         <p:spPr>
           <a:xfrm>
             <a:off x="455613" y="308848"/>
-            <a:ext cx="8229600" cy="398406"/>
+            <a:ext cx="8229600" cy="362896"/>
           </a:xfrm>
         </p:spPr>
         <p:txBody>
@@ -15259,7 +15961,7 @@
           <a:p>
             <a:r>
               <a:rPr lang="en-US" dirty="0"/>
-              <a:t>Flash memory</a:t>
+              <a:t>The drone team’s targets:</a:t>
             </a:r>
           </a:p>
         </p:txBody>
@@ -15269,7 +15971,7 @@
           <p:cNvPr id="4" name="Content Placeholder 3">
             <a:extLst>
               <a:ext uri="{FF2B5EF4-FFF2-40B4-BE49-F238E27FC236}">
-                <a16:creationId xmlns:a16="http://schemas.microsoft.com/office/drawing/2014/main" id="{7F3C8502-0B55-49F8-B4D8-C5B0CAC8D167}"/>
+                <a16:creationId xmlns:a16="http://schemas.microsoft.com/office/drawing/2014/main" id="{EAEE4C79-B6AC-4678-8638-ABCEC8EFA081}"/>
               </a:ext>
             </a:extLst>
           </p:cNvPr>
@@ -15282,8 +15984,8 @@
         </p:nvSpPr>
         <p:spPr>
           <a:xfrm>
-            <a:off x="455613" y="742765"/>
-            <a:ext cx="8228012" cy="3886385"/>
+            <a:off x="455613" y="707255"/>
+            <a:ext cx="8228012" cy="3921896"/>
           </a:xfrm>
         </p:spPr>
         <p:txBody>
@@ -15291,137 +15993,152 @@
           <a:lstStyle/>
           <a:p>
             <a:pPr marL="285750" indent="-285750">
+              <a:spcBef>
+                <a:spcPts val="600"/>
+              </a:spcBef>
               <a:buFont typeface="Arial" panose="020B0604020202020204" pitchFamily="34" charset="0"/>
               <a:buChar char="•"/>
             </a:pPr>
             <a:r>
               <a:rPr lang="en-US" sz="1400" dirty="0"/>
-              <a:t>Non volatile programable memory</a:t>
-            </a:r>
-          </a:p>
-          <a:p>
-            <a:pPr marL="285750" indent="-285750">
+              <a:t>Design and build a complete drone</a:t>
+            </a:r>
+          </a:p>
+          <a:p>
+            <a:pPr marL="511175" lvl="1" indent="-285750">
+              <a:spcBef>
+                <a:spcPts val="600"/>
+              </a:spcBef>
               <a:buFont typeface="Arial" panose="020B0604020202020204" pitchFamily="34" charset="0"/>
               <a:buChar char="•"/>
             </a:pPr>
             <a:r>
               <a:rPr lang="en-US" sz="1400" dirty="0"/>
-              <a:t>Most common interface is SPI (1,4 or 8 bits)</a:t>
-            </a:r>
-          </a:p>
-          <a:p>
-            <a:pPr marL="285750" indent="-285750">
+              <a:t>Design and manufacture the board controlling the drone</a:t>
+            </a:r>
+          </a:p>
+          <a:p>
+            <a:pPr marL="511175" lvl="1" indent="-285750">
+              <a:spcBef>
+                <a:spcPts val="600"/>
+              </a:spcBef>
               <a:buFont typeface="Arial" panose="020B0604020202020204" pitchFamily="34" charset="0"/>
               <a:buChar char="•"/>
             </a:pPr>
             <a:r>
               <a:rPr lang="en-US" sz="1400" dirty="0"/>
-              <a:t>Sector based (4KB, 8KB, 16KB, 64KB, 128KB) – ESP32’s flash sector size is 4KB</a:t>
-            </a:r>
-          </a:p>
-          <a:p>
-            <a:pPr marL="285750" indent="-285750">
+              <a:t>3D design and print the chassis </a:t>
+            </a:r>
+          </a:p>
+          <a:p>
+            <a:pPr marL="511175" lvl="1" indent="-285750">
+              <a:spcBef>
+                <a:spcPts val="600"/>
+              </a:spcBef>
               <a:buFont typeface="Arial" panose="020B0604020202020204" pitchFamily="34" charset="0"/>
               <a:buChar char="•"/>
             </a:pPr>
             <a:r>
               <a:rPr lang="en-US" sz="1400" dirty="0"/>
-              <a:t>After erase the state of all erased bits is logic 1(0xFFFFFFFF)</a:t>
+              <a:t>Code the drones flight control SW</a:t>
             </a:r>
           </a:p>
           <a:p>
             <a:pPr marL="285750" indent="-285750">
+              <a:spcBef>
+                <a:spcPts val="600"/>
+              </a:spcBef>
               <a:buFont typeface="Arial" panose="020B0604020202020204" pitchFamily="34" charset="0"/>
               <a:buChar char="•"/>
             </a:pPr>
             <a:r>
               <a:rPr lang="en-US" sz="1400" dirty="0"/>
-              <a:t>We can set any bit to 0, but cannot set it back to 1 unless we </a:t>
-            </a:r>
-            <a:r>
-              <a:rPr lang="en-US" sz="1400" b="1" dirty="0"/>
-              <a:t>erase a complete sector</a:t>
-            </a:r>
-          </a:p>
-          <a:p>
-            <a:pPr marL="285750" indent="-285750">
-              <a:buFont typeface="Arial" panose="020B0604020202020204" pitchFamily="34" charset="0"/>
-              <a:buChar char="•"/>
-            </a:pPr>
-            <a:r>
-              <a:rPr lang="en-US" sz="1400" dirty="0"/>
-              <a:t>Sector can be erased around </a:t>
-            </a:r>
-            <a:r>
-              <a:rPr lang="en-US" sz="1400" b="1" dirty="0"/>
-              <a:t>100000</a:t>
-            </a:r>
-            <a:r>
-              <a:rPr lang="en-US" sz="1400" dirty="0"/>
-              <a:t> times!! That’s all!!</a:t>
-            </a:r>
-          </a:p>
-          <a:p>
-            <a:pPr marL="285750" indent="-285750">
-              <a:buFont typeface="Arial" panose="020B0604020202020204" pitchFamily="34" charset="0"/>
-              <a:buChar char="•"/>
-            </a:pPr>
-            <a:r>
-              <a:rPr lang="en-US" sz="1400" dirty="0"/>
-              <a:t>Erase operation is long (~10ms)</a:t>
-            </a:r>
-          </a:p>
-          <a:p>
-            <a:pPr marL="285750" indent="-285750">
-              <a:buFont typeface="Arial" panose="020B0604020202020204" pitchFamily="34" charset="0"/>
-              <a:buChar char="•"/>
-            </a:pPr>
-            <a:r>
-              <a:rPr lang="en-US" sz="1400" dirty="0"/>
-              <a:t>Not suitable serving a memory for counters (will stop functioning after 100000 time!)</a:t>
-            </a:r>
-          </a:p>
-          <a:p>
-            <a:pPr marL="285750" indent="-285750">
-              <a:buFont typeface="Arial" panose="020B0604020202020204" pitchFamily="34" charset="0"/>
-              <a:buChar char="•"/>
-            </a:pPr>
-            <a:r>
-              <a:rPr lang="en-US" sz="1400" dirty="0"/>
-              <a:t>Our file system called </a:t>
-            </a:r>
-            <a:r>
-              <a:rPr lang="en-US" sz="1400" dirty="0" err="1"/>
-              <a:t>TinyFFS</a:t>
-            </a:r>
-            <a:r>
-              <a:rPr lang="en-US" sz="1400" dirty="0"/>
-              <a:t> is taking into account these drawbacks</a:t>
-            </a:r>
-          </a:p>
-          <a:p>
-            <a:pPr marL="285750" indent="-285750">
-              <a:buFont typeface="Arial" panose="020B0604020202020204" pitchFamily="34" charset="0"/>
-              <a:buChar char="•"/>
-            </a:pPr>
-            <a:r>
-              <a:rPr lang="en-US" sz="1400" dirty="0"/>
-              <a:t>Sectors can be protected</a:t>
-            </a:r>
-          </a:p>
-          <a:p>
-            <a:pPr marL="285750" indent="-285750">
-              <a:buFont typeface="Arial" panose="020B0604020202020204" pitchFamily="34" charset="0"/>
-              <a:buChar char="•"/>
+              <a:t>The Arcade team will code the remote controller using our platform </a:t>
+            </a:r>
+          </a:p>
+          <a:p>
+            <a:pPr lvl="1" indent="0">
+              <a:spcBef>
+                <a:spcPts val="600"/>
+              </a:spcBef>
+              <a:buNone/>
             </a:pPr>
             <a:endParaRPr lang="en-US" sz="1400" dirty="0"/>
           </a:p>
-        </p:txBody>
-      </p:sp>
+          <a:p>
+            <a:pPr>
+              <a:spcBef>
+                <a:spcPts val="600"/>
+              </a:spcBef>
+            </a:pPr>
+            <a:endParaRPr lang="en-US" sz="1400" dirty="0"/>
+          </a:p>
+        </p:txBody>
+      </p:sp>
+      <p:pic>
+        <p:nvPicPr>
+          <p:cNvPr id="5" name="Picture 4">
+            <a:extLst>
+              <a:ext uri="{FF2B5EF4-FFF2-40B4-BE49-F238E27FC236}">
+                <a16:creationId xmlns:a16="http://schemas.microsoft.com/office/drawing/2014/main" id="{B28C07B9-C389-4857-AECF-5DE60DBFED4A}"/>
+              </a:ext>
+            </a:extLst>
+          </p:cNvPr>
+          <p:cNvPicPr>
+            <a:picLocks noChangeAspect="1"/>
+          </p:cNvPicPr>
+          <p:nvPr/>
+        </p:nvPicPr>
+        <p:blipFill>
+          <a:blip r:embed="rId2"/>
+          <a:stretch>
+            <a:fillRect/>
+          </a:stretch>
+        </p:blipFill>
+        <p:spPr>
+          <a:xfrm>
+            <a:off x="6248675" y="212395"/>
+            <a:ext cx="2810070" cy="2359355"/>
+          </a:xfrm>
+          <a:prstGeom prst="rect">
+            <a:avLst/>
+          </a:prstGeom>
+        </p:spPr>
+      </p:pic>
+      <p:pic>
+        <p:nvPicPr>
+          <p:cNvPr id="6" name="Picture 5">
+            <a:extLst>
+              <a:ext uri="{FF2B5EF4-FFF2-40B4-BE49-F238E27FC236}">
+                <a16:creationId xmlns:a16="http://schemas.microsoft.com/office/drawing/2014/main" id="{E6689AB0-5197-4205-9851-8D5F56DCC70A}"/>
+              </a:ext>
+            </a:extLst>
+          </p:cNvPr>
+          <p:cNvPicPr>
+            <a:picLocks noChangeAspect="1"/>
+          </p:cNvPicPr>
+          <p:nvPr/>
+        </p:nvPicPr>
+        <p:blipFill>
+          <a:blip r:embed="rId3"/>
+          <a:stretch>
+            <a:fillRect/>
+          </a:stretch>
+        </p:blipFill>
+        <p:spPr>
+          <a:xfrm>
+            <a:off x="1758950" y="2340387"/>
+            <a:ext cx="3597664" cy="1995291"/>
+          </a:xfrm>
+          <a:prstGeom prst="rect">
+            <a:avLst/>
+          </a:prstGeom>
+        </p:spPr>
+      </p:pic>
     </p:spTree>
     <p:extLst>
       <p:ext uri="{BB962C8B-B14F-4D97-AF65-F5344CB8AC3E}">
-        <p14:creationId xmlns:p14="http://schemas.microsoft.com/office/powerpoint/2010/main" val="272118857"/>
+        <p14:creationId xmlns:p14="http://schemas.microsoft.com/office/powerpoint/2010/main" val="696355906"/>
       </p:ext>
     </p:extLst>
   </p:cSld>
@@ -15465,6 +16182,265 @@
           <p:cNvPr id="2" name="Slide Number Placeholder 1">
             <a:extLst>
               <a:ext uri="{FF2B5EF4-FFF2-40B4-BE49-F238E27FC236}">
+                <a16:creationId xmlns:a16="http://schemas.microsoft.com/office/drawing/2014/main" id="{EC15537B-EBF1-40F0-884A-8C6B3D25FF1D}"/>
+              </a:ext>
+            </a:extLst>
+          </p:cNvPr>
+          <p:cNvSpPr>
+            <a:spLocks noGrp="1"/>
+          </p:cNvSpPr>
+          <p:nvPr>
+            <p:ph type="sldNum" sz="quarter" idx="12"/>
+          </p:nvPr>
+        </p:nvSpPr>
+        <p:spPr/>
+        <p:txBody>
+          <a:bodyPr/>
+          <a:lstStyle/>
+          <a:p>
+            <a:fld id="{EE2556C5-CE8C-6547-B838-EA80C61A4AF7}" type="slidenum">
+              <a:rPr lang="en-US" smtClean="0"/>
+              <a:pPr/>
+              <a:t>21</a:t>
+            </a:fld>
+            <a:endParaRPr lang="en-US" dirty="0"/>
+          </a:p>
+        </p:txBody>
+      </p:sp>
+      <p:sp>
+        <p:nvSpPr>
+          <p:cNvPr id="3" name="Title 2">
+            <a:extLst>
+              <a:ext uri="{FF2B5EF4-FFF2-40B4-BE49-F238E27FC236}">
+                <a16:creationId xmlns:a16="http://schemas.microsoft.com/office/drawing/2014/main" id="{5DE3C098-505A-4287-AF6E-9C8601CEF656}"/>
+              </a:ext>
+            </a:extLst>
+          </p:cNvPr>
+          <p:cNvSpPr>
+            <a:spLocks noGrp="1"/>
+          </p:cNvSpPr>
+          <p:nvPr>
+            <p:ph type="title"/>
+          </p:nvPr>
+        </p:nvSpPr>
+        <p:spPr>
+          <a:xfrm>
+            <a:off x="455613" y="308848"/>
+            <a:ext cx="8229600" cy="398406"/>
+          </a:xfrm>
+        </p:spPr>
+        <p:txBody>
+          <a:bodyPr/>
+          <a:lstStyle/>
+          <a:p>
+            <a:r>
+              <a:rPr lang="en-US" dirty="0"/>
+              <a:t>Flash memory</a:t>
+            </a:r>
+          </a:p>
+        </p:txBody>
+      </p:sp>
+      <p:sp>
+        <p:nvSpPr>
+          <p:cNvPr id="4" name="Content Placeholder 3">
+            <a:extLst>
+              <a:ext uri="{FF2B5EF4-FFF2-40B4-BE49-F238E27FC236}">
+                <a16:creationId xmlns:a16="http://schemas.microsoft.com/office/drawing/2014/main" id="{7F3C8502-0B55-49F8-B4D8-C5B0CAC8D167}"/>
+              </a:ext>
+            </a:extLst>
+          </p:cNvPr>
+          <p:cNvSpPr>
+            <a:spLocks noGrp="1"/>
+          </p:cNvSpPr>
+          <p:nvPr>
+            <p:ph sz="quarter" idx="13"/>
+          </p:nvPr>
+        </p:nvSpPr>
+        <p:spPr>
+          <a:xfrm>
+            <a:off x="455613" y="742765"/>
+            <a:ext cx="8228012" cy="3886385"/>
+          </a:xfrm>
+        </p:spPr>
+        <p:txBody>
+          <a:bodyPr/>
+          <a:lstStyle/>
+          <a:p>
+            <a:pPr marL="285750" indent="-285750">
+              <a:buFont typeface="Arial" panose="020B0604020202020204" pitchFamily="34" charset="0"/>
+              <a:buChar char="•"/>
+            </a:pPr>
+            <a:r>
+              <a:rPr lang="en-US" sz="1400" dirty="0"/>
+              <a:t>Non volatile programable memory</a:t>
+            </a:r>
+          </a:p>
+          <a:p>
+            <a:pPr marL="285750" indent="-285750">
+              <a:buFont typeface="Arial" panose="020B0604020202020204" pitchFamily="34" charset="0"/>
+              <a:buChar char="•"/>
+            </a:pPr>
+            <a:r>
+              <a:rPr lang="en-US" sz="1400" dirty="0"/>
+              <a:t>Most common interface is SPI (1,4 or 8 bits)</a:t>
+            </a:r>
+          </a:p>
+          <a:p>
+            <a:pPr marL="285750" indent="-285750">
+              <a:buFont typeface="Arial" panose="020B0604020202020204" pitchFamily="34" charset="0"/>
+              <a:buChar char="•"/>
+            </a:pPr>
+            <a:r>
+              <a:rPr lang="en-US" sz="1400" dirty="0"/>
+              <a:t>Sector based (4KB, 8KB, 16KB, 64KB, 128KB) – ESP32’s flash sector size is 4KB</a:t>
+            </a:r>
+          </a:p>
+          <a:p>
+            <a:pPr marL="285750" indent="-285750">
+              <a:buFont typeface="Arial" panose="020B0604020202020204" pitchFamily="34" charset="0"/>
+              <a:buChar char="•"/>
+            </a:pPr>
+            <a:r>
+              <a:rPr lang="en-US" sz="1400" dirty="0"/>
+              <a:t>After erase the state of all erased bits is logic 1(0xFFFFFFFF)</a:t>
+            </a:r>
+          </a:p>
+          <a:p>
+            <a:pPr marL="285750" indent="-285750">
+              <a:buFont typeface="Arial" panose="020B0604020202020204" pitchFamily="34" charset="0"/>
+              <a:buChar char="•"/>
+            </a:pPr>
+            <a:r>
+              <a:rPr lang="en-US" sz="1400" dirty="0"/>
+              <a:t>We can set any bit to 0, but cannot set it back to 1 unless we </a:t>
+            </a:r>
+            <a:r>
+              <a:rPr lang="en-US" sz="1400" b="1" dirty="0"/>
+              <a:t>erase a complete sector</a:t>
+            </a:r>
+          </a:p>
+          <a:p>
+            <a:pPr marL="285750" indent="-285750">
+              <a:buFont typeface="Arial" panose="020B0604020202020204" pitchFamily="34" charset="0"/>
+              <a:buChar char="•"/>
+            </a:pPr>
+            <a:r>
+              <a:rPr lang="en-US" sz="1400" dirty="0"/>
+              <a:t>Sector can be erased around </a:t>
+            </a:r>
+            <a:r>
+              <a:rPr lang="en-US" sz="1400" b="1" dirty="0"/>
+              <a:t>100000</a:t>
+            </a:r>
+            <a:r>
+              <a:rPr lang="en-US" sz="1400" dirty="0"/>
+              <a:t> times!! That’s all!!</a:t>
+            </a:r>
+          </a:p>
+          <a:p>
+            <a:pPr marL="285750" indent="-285750">
+              <a:buFont typeface="Arial" panose="020B0604020202020204" pitchFamily="34" charset="0"/>
+              <a:buChar char="•"/>
+            </a:pPr>
+            <a:r>
+              <a:rPr lang="en-US" sz="1400" dirty="0"/>
+              <a:t>Erase operation is long (~10ms)</a:t>
+            </a:r>
+          </a:p>
+          <a:p>
+            <a:pPr marL="285750" indent="-285750">
+              <a:buFont typeface="Arial" panose="020B0604020202020204" pitchFamily="34" charset="0"/>
+              <a:buChar char="•"/>
+            </a:pPr>
+            <a:r>
+              <a:rPr lang="en-US" sz="1400" dirty="0"/>
+              <a:t>Not suitable serving a memory for counters (will stop functioning after 100000 time!)</a:t>
+            </a:r>
+          </a:p>
+          <a:p>
+            <a:pPr marL="285750" indent="-285750">
+              <a:buFont typeface="Arial" panose="020B0604020202020204" pitchFamily="34" charset="0"/>
+              <a:buChar char="•"/>
+            </a:pPr>
+            <a:r>
+              <a:rPr lang="en-US" sz="1400" dirty="0"/>
+              <a:t>Our file system called </a:t>
+            </a:r>
+            <a:r>
+              <a:rPr lang="en-US" sz="1400" dirty="0" err="1"/>
+              <a:t>TinyFFS</a:t>
+            </a:r>
+            <a:r>
+              <a:rPr lang="en-US" sz="1400" dirty="0"/>
+              <a:t> is taking into account these drawbacks</a:t>
+            </a:r>
+          </a:p>
+          <a:p>
+            <a:pPr marL="285750" indent="-285750">
+              <a:buFont typeface="Arial" panose="020B0604020202020204" pitchFamily="34" charset="0"/>
+              <a:buChar char="•"/>
+            </a:pPr>
+            <a:r>
+              <a:rPr lang="en-US" sz="1400" dirty="0"/>
+              <a:t>Sectors can be protected</a:t>
+            </a:r>
+          </a:p>
+          <a:p>
+            <a:pPr marL="285750" indent="-285750">
+              <a:buFont typeface="Arial" panose="020B0604020202020204" pitchFamily="34" charset="0"/>
+              <a:buChar char="•"/>
+            </a:pPr>
+            <a:endParaRPr lang="en-US" sz="1400" dirty="0"/>
+          </a:p>
+        </p:txBody>
+      </p:sp>
+    </p:spTree>
+    <p:extLst>
+      <p:ext uri="{BB962C8B-B14F-4D97-AF65-F5344CB8AC3E}">
+        <p14:creationId xmlns:p14="http://schemas.microsoft.com/office/powerpoint/2010/main" val="272118857"/>
+      </p:ext>
+    </p:extLst>
+  </p:cSld>
+  <p:clrMapOvr>
+    <a:masterClrMapping/>
+  </p:clrMapOvr>
+  <mc:AlternateContent xmlns:mc="http://schemas.openxmlformats.org/markup-compatibility/2006" xmlns:p14="http://schemas.microsoft.com/office/powerpoint/2010/main">
+    <mc:Choice Requires="p14">
+      <p:transition spd="med" p14:dur="700">
+        <p:fade/>
+      </p:transition>
+    </mc:Choice>
+    <mc:Fallback xmlns="">
+      <p:transition spd="med">
+        <p:fade/>
+      </p:transition>
+    </mc:Fallback>
+  </mc:AlternateContent>
+</p:sld>
+</file>
+
+<file path=ppt/slides/slide22.xml><?xml version="1.0" encoding="utf-8"?>
+<p:sld xmlns:a="http://schemas.openxmlformats.org/drawingml/2006/main" xmlns:r="http://schemas.openxmlformats.org/officeDocument/2006/relationships" xmlns:p="http://schemas.openxmlformats.org/presentationml/2006/main">
+  <p:cSld>
+    <p:spTree>
+      <p:nvGrpSpPr>
+        <p:cNvPr id="1" name=""/>
+        <p:cNvGrpSpPr/>
+        <p:nvPr/>
+      </p:nvGrpSpPr>
+      <p:grpSpPr>
+        <a:xfrm>
+          <a:off x="0" y="0"/>
+          <a:ext cx="0" cy="0"/>
+          <a:chOff x="0" y="0"/>
+          <a:chExt cx="0" cy="0"/>
+        </a:xfrm>
+      </p:grpSpPr>
+      <p:sp>
+        <p:nvSpPr>
+          <p:cNvPr id="2" name="Slide Number Placeholder 1">
+            <a:extLst>
+              <a:ext uri="{FF2B5EF4-FFF2-40B4-BE49-F238E27FC236}">
                 <a16:creationId xmlns:a16="http://schemas.microsoft.com/office/drawing/2014/main" id="{B2AB084F-0E54-4D2D-A8C2-4B8484E39932}"/>
               </a:ext>
             </a:extLst>
@@ -15484,7 +16460,7 @@
             <a:fld id="{EE2556C5-CE8C-6547-B838-EA80C61A4AF7}" type="slidenum">
               <a:rPr lang="en-US" smtClean="0"/>
               <a:pPr/>
-              <a:t>21</a:t>
+              <a:t>22</a:t>
             </a:fld>
             <a:endParaRPr lang="en-US" dirty="0"/>
           </a:p>
@@ -15758,7 +16734,7 @@
 </p:sld>
 </file>
 
-<file path=ppt/slides/slide22.xml><?xml version="1.0" encoding="utf-8"?>
+<file path=ppt/slides/slide23.xml><?xml version="1.0" encoding="utf-8"?>
 <p:sld xmlns:a="http://schemas.openxmlformats.org/drawingml/2006/main" xmlns:r="http://schemas.openxmlformats.org/officeDocument/2006/relationships" xmlns:p="http://schemas.openxmlformats.org/presentationml/2006/main">
   <p:cSld>
     <p:spTree>

</xml_diff>